<commit_message>
New script. No Manuel thing. That was ridiculous. Why didn't you tell me?
</commit_message>
<xml_diff>
--- a/Presentation.pptx
+++ b/Presentation.pptx
@@ -5,17 +5,24 @@
     <p:sldMasterId id="2147483648" r:id="rId1"/>
   </p:sldMasterIdLst>
   <p:notesMasterIdLst>
-    <p:notesMasterId r:id="rId10"/>
+    <p:notesMasterId r:id="rId17"/>
   </p:notesMasterIdLst>
   <p:sldIdLst>
     <p:sldId id="256" r:id="rId2"/>
     <p:sldId id="257" r:id="rId3"/>
     <p:sldId id="258" r:id="rId4"/>
     <p:sldId id="259" r:id="rId5"/>
-    <p:sldId id="261" r:id="rId6"/>
-    <p:sldId id="260" r:id="rId7"/>
-    <p:sldId id="262" r:id="rId8"/>
-    <p:sldId id="263" r:id="rId9"/>
+    <p:sldId id="260" r:id="rId6"/>
+    <p:sldId id="262" r:id="rId7"/>
+    <p:sldId id="263" r:id="rId8"/>
+    <p:sldId id="264" r:id="rId9"/>
+    <p:sldId id="265" r:id="rId10"/>
+    <p:sldId id="266" r:id="rId11"/>
+    <p:sldId id="268" r:id="rId12"/>
+    <p:sldId id="267" r:id="rId13"/>
+    <p:sldId id="269" r:id="rId14"/>
+    <p:sldId id="270" r:id="rId15"/>
+    <p:sldId id="271" r:id="rId16"/>
   </p:sldIdLst>
   <p:sldSz cx="9144000" cy="6858000" type="screen4x3"/>
   <p:notesSz cx="6858000" cy="9144000"/>
@@ -200,7 +207,7 @@
             <a:fld id="{2296040D-0F06-4EA9-8286-50A0C738388B}" type="datetimeFigureOut">
               <a:rPr lang="en-US" smtClean="0"/>
               <a:pPr/>
-              <a:t>11/2/2010</a:t>
+              <a:t>11/16/2010</a:t>
             </a:fld>
             <a:endParaRPr lang="en-US"/>
           </a:p>
@@ -512,6 +519,14 @@
           </a:bodyPr>
           <a:lstStyle/>
           <a:p>
+            <a:r>
+              <a:rPr lang="pt-BR" dirty="0" smtClean="0"/>
+              <a:t>Gostaria de saber como ela</a:t>
+            </a:r>
+            <a:r>
+              <a:rPr lang="pt-BR" baseline="0" dirty="0" smtClean="0"/>
+              <a:t> vai colocar essa peça ai</a:t>
+            </a:r>
             <a:endParaRPr lang="en-US" dirty="0"/>
           </a:p>
         </p:txBody>
@@ -534,7 +549,726 @@
             <a:fld id="{B26A75E8-9EC7-42DF-8FCD-4AF46A032700}" type="slidenum">
               <a:rPr lang="en-US" smtClean="0"/>
               <a:pPr/>
-              <a:t>8</a:t>
+              <a:t>1</a:t>
+            </a:fld>
+            <a:endParaRPr lang="en-US"/>
+          </a:p>
+        </p:txBody>
+      </p:sp>
+    </p:spTree>
+  </p:cSld>
+  <p:clrMapOvr>
+    <a:masterClrMapping/>
+  </p:clrMapOvr>
+</p:notes>
+</file>
+
+<file path=ppt/notesSlides/notesSlide2.xml><?xml version="1.0" encoding="utf-8"?>
+<p:notes xmlns:a="http://schemas.openxmlformats.org/drawingml/2006/main" xmlns:r="http://schemas.openxmlformats.org/officeDocument/2006/relationships" xmlns:p="http://schemas.openxmlformats.org/presentationml/2006/main">
+  <p:cSld>
+    <p:spTree>
+      <p:nvGrpSpPr>
+        <p:cNvPr id="1" name=""/>
+        <p:cNvGrpSpPr/>
+        <p:nvPr/>
+      </p:nvGrpSpPr>
+      <p:grpSpPr>
+        <a:xfrm>
+          <a:off x="0" y="0"/>
+          <a:ext cx="0" cy="0"/>
+          <a:chOff x="0" y="0"/>
+          <a:chExt cx="0" cy="0"/>
+        </a:xfrm>
+      </p:grpSpPr>
+      <p:sp>
+        <p:nvSpPr>
+          <p:cNvPr id="2" name="Slide Image Placeholder 1"/>
+          <p:cNvSpPr>
+            <a:spLocks noGrp="1" noRot="1" noChangeAspect="1"/>
+          </p:cNvSpPr>
+          <p:nvPr>
+            <p:ph type="sldImg"/>
+          </p:nvPr>
+        </p:nvSpPr>
+        <p:spPr/>
+      </p:sp>
+      <p:sp>
+        <p:nvSpPr>
+          <p:cNvPr id="3" name="Notes Placeholder 2"/>
+          <p:cNvSpPr>
+            <a:spLocks noGrp="1"/>
+          </p:cNvSpPr>
+          <p:nvPr>
+            <p:ph type="body" idx="1"/>
+          </p:nvPr>
+        </p:nvSpPr>
+        <p:spPr/>
+        <p:txBody>
+          <a:bodyPr>
+            <a:normAutofit/>
+          </a:bodyPr>
+          <a:lstStyle/>
+          <a:p>
+            <a:r>
+              <a:rPr lang="pt-BR" dirty="0" smtClean="0"/>
+              <a:t>Vocês me conhecem do .Net</a:t>
+            </a:r>
+            <a:r>
+              <a:rPr lang="pt-BR" baseline="0" dirty="0" smtClean="0"/>
+              <a:t> </a:t>
+            </a:r>
+            <a:r>
+              <a:rPr lang="pt-BR" baseline="0" dirty="0" err="1" smtClean="0"/>
+              <a:t>Architects</a:t>
+            </a:r>
+            <a:endParaRPr lang="pt-BR" baseline="0" dirty="0" smtClean="0"/>
+          </a:p>
+          <a:p>
+            <a:r>
+              <a:rPr lang="pt-BR" baseline="0" dirty="0" smtClean="0"/>
+              <a:t>Meu </a:t>
+            </a:r>
+            <a:r>
+              <a:rPr lang="pt-BR" baseline="0" dirty="0" err="1" smtClean="0"/>
+              <a:t>twitter</a:t>
+            </a:r>
+            <a:endParaRPr lang="pt-BR" baseline="0" dirty="0" smtClean="0"/>
+          </a:p>
+          <a:p>
+            <a:r>
+              <a:rPr lang="pt-BR" baseline="0" dirty="0" smtClean="0"/>
+              <a:t>Meu </a:t>
+            </a:r>
+            <a:r>
+              <a:rPr lang="pt-BR" baseline="0" dirty="0" err="1" smtClean="0"/>
+              <a:t>github</a:t>
+            </a:r>
+            <a:endParaRPr lang="pt-BR" baseline="0" dirty="0" smtClean="0"/>
+          </a:p>
+          <a:p>
+            <a:r>
+              <a:rPr lang="pt-BR" baseline="0" dirty="0" smtClean="0"/>
+              <a:t>Odeio </a:t>
+            </a:r>
+            <a:r>
+              <a:rPr lang="pt-BR" baseline="0" dirty="0" err="1" smtClean="0"/>
+              <a:t>powerpoints</a:t>
+            </a:r>
+            <a:endParaRPr lang="en-US" dirty="0"/>
+          </a:p>
+        </p:txBody>
+      </p:sp>
+      <p:sp>
+        <p:nvSpPr>
+          <p:cNvPr id="4" name="Slide Number Placeholder 3"/>
+          <p:cNvSpPr>
+            <a:spLocks noGrp="1"/>
+          </p:cNvSpPr>
+          <p:nvPr>
+            <p:ph type="sldNum" sz="quarter" idx="10"/>
+          </p:nvPr>
+        </p:nvSpPr>
+        <p:spPr/>
+        <p:txBody>
+          <a:bodyPr/>
+          <a:lstStyle/>
+          <a:p>
+            <a:fld id="{B26A75E8-9EC7-42DF-8FCD-4AF46A032700}" type="slidenum">
+              <a:rPr lang="en-US" smtClean="0"/>
+              <a:pPr/>
+              <a:t>2</a:t>
+            </a:fld>
+            <a:endParaRPr lang="en-US"/>
+          </a:p>
+        </p:txBody>
+      </p:sp>
+    </p:spTree>
+  </p:cSld>
+  <p:clrMapOvr>
+    <a:masterClrMapping/>
+  </p:clrMapOvr>
+</p:notes>
+</file>
+
+<file path=ppt/notesSlides/notesSlide3.xml><?xml version="1.0" encoding="utf-8"?>
+<p:notes xmlns:a="http://schemas.openxmlformats.org/drawingml/2006/main" xmlns:r="http://schemas.openxmlformats.org/officeDocument/2006/relationships" xmlns:p="http://schemas.openxmlformats.org/presentationml/2006/main">
+  <p:cSld>
+    <p:spTree>
+      <p:nvGrpSpPr>
+        <p:cNvPr id="1" name=""/>
+        <p:cNvGrpSpPr/>
+        <p:nvPr/>
+      </p:nvGrpSpPr>
+      <p:grpSpPr>
+        <a:xfrm>
+          <a:off x="0" y="0"/>
+          <a:ext cx="0" cy="0"/>
+          <a:chOff x="0" y="0"/>
+          <a:chExt cx="0" cy="0"/>
+        </a:xfrm>
+      </p:grpSpPr>
+      <p:sp>
+        <p:nvSpPr>
+          <p:cNvPr id="2" name="Slide Image Placeholder 1"/>
+          <p:cNvSpPr>
+            <a:spLocks noGrp="1" noRot="1" noChangeAspect="1"/>
+          </p:cNvSpPr>
+          <p:nvPr>
+            <p:ph type="sldImg"/>
+          </p:nvPr>
+        </p:nvSpPr>
+        <p:spPr/>
+      </p:sp>
+      <p:sp>
+        <p:nvSpPr>
+          <p:cNvPr id="3" name="Notes Placeholder 2"/>
+          <p:cNvSpPr>
+            <a:spLocks noGrp="1"/>
+          </p:cNvSpPr>
+          <p:nvPr>
+            <p:ph type="body" idx="1"/>
+          </p:nvPr>
+        </p:nvSpPr>
+        <p:spPr/>
+        <p:txBody>
+          <a:bodyPr>
+            <a:normAutofit/>
+          </a:bodyPr>
+          <a:lstStyle/>
+          <a:p>
+            <a:r>
+              <a:rPr lang="pt-BR" dirty="0" smtClean="0"/>
+              <a:t>Palestra dividida em 2 partes</a:t>
+            </a:r>
+          </a:p>
+          <a:p>
+            <a:r>
+              <a:rPr lang="pt-BR" dirty="0" smtClean="0"/>
+              <a:t>Como usar</a:t>
+            </a:r>
+            <a:r>
+              <a:rPr lang="pt-BR" baseline="0" dirty="0" smtClean="0"/>
+              <a:t> um servidor de integração contínua</a:t>
+            </a:r>
+          </a:p>
+          <a:p>
+            <a:r>
+              <a:rPr lang="pt-BR" baseline="0" dirty="0" smtClean="0"/>
+              <a:t>Porque usar um servidor de integração contínua</a:t>
+            </a:r>
+            <a:endParaRPr lang="en-US" dirty="0"/>
+          </a:p>
+        </p:txBody>
+      </p:sp>
+      <p:sp>
+        <p:nvSpPr>
+          <p:cNvPr id="4" name="Slide Number Placeholder 3"/>
+          <p:cNvSpPr>
+            <a:spLocks noGrp="1"/>
+          </p:cNvSpPr>
+          <p:nvPr>
+            <p:ph type="sldNum" sz="quarter" idx="10"/>
+          </p:nvPr>
+        </p:nvSpPr>
+        <p:spPr/>
+        <p:txBody>
+          <a:bodyPr/>
+          <a:lstStyle/>
+          <a:p>
+            <a:fld id="{B26A75E8-9EC7-42DF-8FCD-4AF46A032700}" type="slidenum">
+              <a:rPr lang="en-US" smtClean="0"/>
+              <a:pPr/>
+              <a:t>3</a:t>
+            </a:fld>
+            <a:endParaRPr lang="en-US"/>
+          </a:p>
+        </p:txBody>
+      </p:sp>
+    </p:spTree>
+  </p:cSld>
+  <p:clrMapOvr>
+    <a:masterClrMapping/>
+  </p:clrMapOvr>
+</p:notes>
+</file>
+
+<file path=ppt/notesSlides/notesSlide4.xml><?xml version="1.0" encoding="utf-8"?>
+<p:notes xmlns:a="http://schemas.openxmlformats.org/drawingml/2006/main" xmlns:r="http://schemas.openxmlformats.org/officeDocument/2006/relationships" xmlns:p="http://schemas.openxmlformats.org/presentationml/2006/main">
+  <p:cSld>
+    <p:spTree>
+      <p:nvGrpSpPr>
+        <p:cNvPr id="1" name=""/>
+        <p:cNvGrpSpPr/>
+        <p:nvPr/>
+      </p:nvGrpSpPr>
+      <p:grpSpPr>
+        <a:xfrm>
+          <a:off x="0" y="0"/>
+          <a:ext cx="0" cy="0"/>
+          <a:chOff x="0" y="0"/>
+          <a:chExt cx="0" cy="0"/>
+        </a:xfrm>
+      </p:grpSpPr>
+      <p:sp>
+        <p:nvSpPr>
+          <p:cNvPr id="2" name="Slide Image Placeholder 1"/>
+          <p:cNvSpPr>
+            <a:spLocks noGrp="1" noRot="1" noChangeAspect="1"/>
+          </p:cNvSpPr>
+          <p:nvPr>
+            <p:ph type="sldImg"/>
+          </p:nvPr>
+        </p:nvSpPr>
+        <p:spPr/>
+      </p:sp>
+      <p:sp>
+        <p:nvSpPr>
+          <p:cNvPr id="3" name="Notes Placeholder 2"/>
+          <p:cNvSpPr>
+            <a:spLocks noGrp="1"/>
+          </p:cNvSpPr>
+          <p:nvPr>
+            <p:ph type="body" idx="1"/>
+          </p:nvPr>
+        </p:nvSpPr>
+        <p:spPr/>
+        <p:txBody>
+          <a:bodyPr>
+            <a:normAutofit/>
+          </a:bodyPr>
+          <a:lstStyle/>
+          <a:p>
+            <a:r>
+              <a:rPr lang="pt-BR" dirty="0" smtClean="0"/>
+              <a:t>Na primeira parte, vou mostrar</a:t>
+            </a:r>
+            <a:r>
+              <a:rPr lang="pt-BR" baseline="0" dirty="0" smtClean="0"/>
+              <a:t> como instalar um servidor de integração contínua</a:t>
+            </a:r>
+          </a:p>
+          <a:p>
+            <a:r>
+              <a:rPr lang="pt-BR" baseline="0" dirty="0" smtClean="0"/>
+              <a:t>Slides com gatos sempre funcionam</a:t>
+            </a:r>
+            <a:endParaRPr lang="en-US" dirty="0"/>
+          </a:p>
+        </p:txBody>
+      </p:sp>
+      <p:sp>
+        <p:nvSpPr>
+          <p:cNvPr id="4" name="Slide Number Placeholder 3"/>
+          <p:cNvSpPr>
+            <a:spLocks noGrp="1"/>
+          </p:cNvSpPr>
+          <p:nvPr>
+            <p:ph type="sldNum" sz="quarter" idx="10"/>
+          </p:nvPr>
+        </p:nvSpPr>
+        <p:spPr/>
+        <p:txBody>
+          <a:bodyPr/>
+          <a:lstStyle/>
+          <a:p>
+            <a:fld id="{B26A75E8-9EC7-42DF-8FCD-4AF46A032700}" type="slidenum">
+              <a:rPr lang="en-US" smtClean="0"/>
+              <a:pPr/>
+              <a:t>4</a:t>
+            </a:fld>
+            <a:endParaRPr lang="en-US"/>
+          </a:p>
+        </p:txBody>
+      </p:sp>
+    </p:spTree>
+  </p:cSld>
+  <p:clrMapOvr>
+    <a:masterClrMapping/>
+  </p:clrMapOvr>
+</p:notes>
+</file>
+
+<file path=ppt/notesSlides/notesSlide5.xml><?xml version="1.0" encoding="utf-8"?>
+<p:notes xmlns:a="http://schemas.openxmlformats.org/drawingml/2006/main" xmlns:r="http://schemas.openxmlformats.org/officeDocument/2006/relationships" xmlns:p="http://schemas.openxmlformats.org/presentationml/2006/main">
+  <p:cSld>
+    <p:spTree>
+      <p:nvGrpSpPr>
+        <p:cNvPr id="1" name=""/>
+        <p:cNvGrpSpPr/>
+        <p:nvPr/>
+      </p:nvGrpSpPr>
+      <p:grpSpPr>
+        <a:xfrm>
+          <a:off x="0" y="0"/>
+          <a:ext cx="0" cy="0"/>
+          <a:chOff x="0" y="0"/>
+          <a:chExt cx="0" cy="0"/>
+        </a:xfrm>
+      </p:grpSpPr>
+      <p:sp>
+        <p:nvSpPr>
+          <p:cNvPr id="2" name="Slide Image Placeholder 1"/>
+          <p:cNvSpPr>
+            <a:spLocks noGrp="1" noRot="1" noChangeAspect="1"/>
+          </p:cNvSpPr>
+          <p:nvPr>
+            <p:ph type="sldImg"/>
+          </p:nvPr>
+        </p:nvSpPr>
+        <p:spPr/>
+      </p:sp>
+      <p:sp>
+        <p:nvSpPr>
+          <p:cNvPr id="3" name="Notes Placeholder 2"/>
+          <p:cNvSpPr>
+            <a:spLocks noGrp="1"/>
+          </p:cNvSpPr>
+          <p:nvPr>
+            <p:ph type="body" idx="1"/>
+          </p:nvPr>
+        </p:nvSpPr>
+        <p:spPr/>
+        <p:txBody>
+          <a:bodyPr>
+            <a:normAutofit/>
+          </a:bodyPr>
+          <a:lstStyle/>
+          <a:p>
+            <a:r>
+              <a:rPr lang="pt-BR" dirty="0" smtClean="0"/>
+              <a:t>Sério galera, um</a:t>
+            </a:r>
+            <a:r>
+              <a:rPr lang="pt-BR" baseline="0" dirty="0" smtClean="0"/>
+              <a:t> servidor de integração contínua não é tudo isso</a:t>
+            </a:r>
+            <a:endParaRPr lang="en-US" dirty="0"/>
+          </a:p>
+        </p:txBody>
+      </p:sp>
+      <p:sp>
+        <p:nvSpPr>
+          <p:cNvPr id="4" name="Slide Number Placeholder 3"/>
+          <p:cNvSpPr>
+            <a:spLocks noGrp="1"/>
+          </p:cNvSpPr>
+          <p:nvPr>
+            <p:ph type="sldNum" sz="quarter" idx="10"/>
+          </p:nvPr>
+        </p:nvSpPr>
+        <p:spPr/>
+        <p:txBody>
+          <a:bodyPr/>
+          <a:lstStyle/>
+          <a:p>
+            <a:fld id="{B26A75E8-9EC7-42DF-8FCD-4AF46A032700}" type="slidenum">
+              <a:rPr lang="en-US" smtClean="0"/>
+              <a:pPr/>
+              <a:t>10</a:t>
+            </a:fld>
+            <a:endParaRPr lang="en-US"/>
+          </a:p>
+        </p:txBody>
+      </p:sp>
+    </p:spTree>
+  </p:cSld>
+  <p:clrMapOvr>
+    <a:masterClrMapping/>
+  </p:clrMapOvr>
+</p:notes>
+</file>
+
+<file path=ppt/notesSlides/notesSlide6.xml><?xml version="1.0" encoding="utf-8"?>
+<p:notes xmlns:a="http://schemas.openxmlformats.org/drawingml/2006/main" xmlns:r="http://schemas.openxmlformats.org/officeDocument/2006/relationships" xmlns:p="http://schemas.openxmlformats.org/presentationml/2006/main">
+  <p:cSld>
+    <p:spTree>
+      <p:nvGrpSpPr>
+        <p:cNvPr id="1" name=""/>
+        <p:cNvGrpSpPr/>
+        <p:nvPr/>
+      </p:nvGrpSpPr>
+      <p:grpSpPr>
+        <a:xfrm>
+          <a:off x="0" y="0"/>
+          <a:ext cx="0" cy="0"/>
+          <a:chOff x="0" y="0"/>
+          <a:chExt cx="0" cy="0"/>
+        </a:xfrm>
+      </p:grpSpPr>
+      <p:sp>
+        <p:nvSpPr>
+          <p:cNvPr id="2" name="Slide Image Placeholder 1"/>
+          <p:cNvSpPr>
+            <a:spLocks noGrp="1" noRot="1" noChangeAspect="1"/>
+          </p:cNvSpPr>
+          <p:nvPr>
+            <p:ph type="sldImg"/>
+          </p:nvPr>
+        </p:nvSpPr>
+        <p:spPr/>
+      </p:sp>
+      <p:sp>
+        <p:nvSpPr>
+          <p:cNvPr id="3" name="Notes Placeholder 2"/>
+          <p:cNvSpPr>
+            <a:spLocks noGrp="1"/>
+          </p:cNvSpPr>
+          <p:nvPr>
+            <p:ph type="body" idx="1"/>
+          </p:nvPr>
+        </p:nvSpPr>
+        <p:spPr/>
+        <p:txBody>
+          <a:bodyPr>
+            <a:normAutofit/>
+          </a:bodyPr>
+          <a:lstStyle/>
+          <a:p>
+            <a:r>
+              <a:rPr lang="pt-BR" dirty="0" smtClean="0"/>
+              <a:t>Muitas ferramentas</a:t>
+            </a:r>
+            <a:r>
+              <a:rPr lang="pt-BR" baseline="0" dirty="0" smtClean="0"/>
+              <a:t> no mercado</a:t>
+            </a:r>
+            <a:endParaRPr lang="en-US" dirty="0"/>
+          </a:p>
+        </p:txBody>
+      </p:sp>
+      <p:sp>
+        <p:nvSpPr>
+          <p:cNvPr id="4" name="Slide Number Placeholder 3"/>
+          <p:cNvSpPr>
+            <a:spLocks noGrp="1"/>
+          </p:cNvSpPr>
+          <p:nvPr>
+            <p:ph type="sldNum" sz="quarter" idx="10"/>
+          </p:nvPr>
+        </p:nvSpPr>
+        <p:spPr/>
+        <p:txBody>
+          <a:bodyPr/>
+          <a:lstStyle/>
+          <a:p>
+            <a:fld id="{B26A75E8-9EC7-42DF-8FCD-4AF46A032700}" type="slidenum">
+              <a:rPr lang="en-US" smtClean="0"/>
+              <a:pPr/>
+              <a:t>11</a:t>
+            </a:fld>
+            <a:endParaRPr lang="en-US"/>
+          </a:p>
+        </p:txBody>
+      </p:sp>
+    </p:spTree>
+  </p:cSld>
+  <p:clrMapOvr>
+    <a:masterClrMapping/>
+  </p:clrMapOvr>
+</p:notes>
+</file>
+
+<file path=ppt/notesSlides/notesSlide7.xml><?xml version="1.0" encoding="utf-8"?>
+<p:notes xmlns:a="http://schemas.openxmlformats.org/drawingml/2006/main" xmlns:r="http://schemas.openxmlformats.org/officeDocument/2006/relationships" xmlns:p="http://schemas.openxmlformats.org/presentationml/2006/main">
+  <p:cSld>
+    <p:spTree>
+      <p:nvGrpSpPr>
+        <p:cNvPr id="1" name=""/>
+        <p:cNvGrpSpPr/>
+        <p:nvPr/>
+      </p:nvGrpSpPr>
+      <p:grpSpPr>
+        <a:xfrm>
+          <a:off x="0" y="0"/>
+          <a:ext cx="0" cy="0"/>
+          <a:chOff x="0" y="0"/>
+          <a:chExt cx="0" cy="0"/>
+        </a:xfrm>
+      </p:grpSpPr>
+      <p:sp>
+        <p:nvSpPr>
+          <p:cNvPr id="2" name="Slide Image Placeholder 1"/>
+          <p:cNvSpPr>
+            <a:spLocks noGrp="1" noRot="1" noChangeAspect="1"/>
+          </p:cNvSpPr>
+          <p:nvPr>
+            <p:ph type="sldImg"/>
+          </p:nvPr>
+        </p:nvSpPr>
+        <p:spPr/>
+      </p:sp>
+      <p:sp>
+        <p:nvSpPr>
+          <p:cNvPr id="3" name="Notes Placeholder 2"/>
+          <p:cNvSpPr>
+            <a:spLocks noGrp="1"/>
+          </p:cNvSpPr>
+          <p:nvPr>
+            <p:ph type="body" idx="1"/>
+          </p:nvPr>
+        </p:nvSpPr>
+        <p:spPr/>
+        <p:txBody>
+          <a:bodyPr>
+            <a:normAutofit/>
+          </a:bodyPr>
+          <a:lstStyle/>
+          <a:p>
+            <a:r>
+              <a:rPr lang="pt-BR" dirty="0" err="1" smtClean="0"/>
+              <a:t>TeamCity</a:t>
+            </a:r>
+            <a:endParaRPr lang="pt-BR" dirty="0" smtClean="0"/>
+          </a:p>
+          <a:p>
+            <a:r>
+              <a:rPr lang="pt-BR" dirty="0" err="1" smtClean="0"/>
+              <a:t>CruiseControl</a:t>
+            </a:r>
+            <a:endParaRPr lang="pt-BR" dirty="0" smtClean="0"/>
+          </a:p>
+          <a:p>
+            <a:r>
+              <a:rPr lang="pt-BR" dirty="0" smtClean="0"/>
+              <a:t>Hudson</a:t>
+            </a:r>
+          </a:p>
+          <a:p>
+            <a:r>
+              <a:rPr lang="pt-BR" dirty="0" err="1" smtClean="0"/>
+              <a:t>Team</a:t>
+            </a:r>
+            <a:r>
+              <a:rPr lang="pt-BR" dirty="0" smtClean="0"/>
+              <a:t> </a:t>
+            </a:r>
+            <a:r>
+              <a:rPr lang="pt-BR" dirty="0" err="1" smtClean="0"/>
+              <a:t>Foundation</a:t>
+            </a:r>
+            <a:r>
+              <a:rPr lang="pt-BR" dirty="0" smtClean="0"/>
+              <a:t> Build</a:t>
+            </a:r>
+            <a:endParaRPr lang="en-US" dirty="0"/>
+          </a:p>
+        </p:txBody>
+      </p:sp>
+      <p:sp>
+        <p:nvSpPr>
+          <p:cNvPr id="4" name="Slide Number Placeholder 3"/>
+          <p:cNvSpPr>
+            <a:spLocks noGrp="1"/>
+          </p:cNvSpPr>
+          <p:nvPr>
+            <p:ph type="sldNum" sz="quarter" idx="10"/>
+          </p:nvPr>
+        </p:nvSpPr>
+        <p:spPr/>
+        <p:txBody>
+          <a:bodyPr/>
+          <a:lstStyle/>
+          <a:p>
+            <a:fld id="{B26A75E8-9EC7-42DF-8FCD-4AF46A032700}" type="slidenum">
+              <a:rPr lang="en-US" smtClean="0"/>
+              <a:pPr/>
+              <a:t>12</a:t>
+            </a:fld>
+            <a:endParaRPr lang="en-US"/>
+          </a:p>
+        </p:txBody>
+      </p:sp>
+    </p:spTree>
+  </p:cSld>
+  <p:clrMapOvr>
+    <a:masterClrMapping/>
+  </p:clrMapOvr>
+</p:notes>
+</file>
+
+<file path=ppt/notesSlides/notesSlide8.xml><?xml version="1.0" encoding="utf-8"?>
+<p:notes xmlns:a="http://schemas.openxmlformats.org/drawingml/2006/main" xmlns:r="http://schemas.openxmlformats.org/officeDocument/2006/relationships" xmlns:p="http://schemas.openxmlformats.org/presentationml/2006/main">
+  <p:cSld>
+    <p:spTree>
+      <p:nvGrpSpPr>
+        <p:cNvPr id="1" name=""/>
+        <p:cNvGrpSpPr/>
+        <p:nvPr/>
+      </p:nvGrpSpPr>
+      <p:grpSpPr>
+        <a:xfrm>
+          <a:off x="0" y="0"/>
+          <a:ext cx="0" cy="0"/>
+          <a:chOff x="0" y="0"/>
+          <a:chExt cx="0" cy="0"/>
+        </a:xfrm>
+      </p:grpSpPr>
+      <p:sp>
+        <p:nvSpPr>
+          <p:cNvPr id="2" name="Slide Image Placeholder 1"/>
+          <p:cNvSpPr>
+            <a:spLocks noGrp="1" noRot="1" noChangeAspect="1"/>
+          </p:cNvSpPr>
+          <p:nvPr>
+            <p:ph type="sldImg"/>
+          </p:nvPr>
+        </p:nvSpPr>
+        <p:spPr/>
+      </p:sp>
+      <p:sp>
+        <p:nvSpPr>
+          <p:cNvPr id="3" name="Notes Placeholder 2"/>
+          <p:cNvSpPr>
+            <a:spLocks noGrp="1"/>
+          </p:cNvSpPr>
+          <p:nvPr>
+            <p:ph type="body" idx="1"/>
+          </p:nvPr>
+        </p:nvSpPr>
+        <p:spPr/>
+        <p:txBody>
+          <a:bodyPr>
+            <a:normAutofit/>
+          </a:bodyPr>
+          <a:lstStyle/>
+          <a:p>
+            <a:r>
+              <a:rPr lang="pt-BR" dirty="0" smtClean="0"/>
+              <a:t>Mas o ciclo de um software</a:t>
+            </a:r>
+            <a:r>
+              <a:rPr lang="pt-BR" baseline="0" dirty="0" smtClean="0"/>
+              <a:t> de integração contínua continua o mesmo</a:t>
+            </a:r>
+          </a:p>
+          <a:p>
+            <a:r>
+              <a:rPr lang="pt-BR" baseline="0" dirty="0" smtClean="0"/>
+              <a:t>Imagem muito legal</a:t>
+            </a:r>
+            <a:endParaRPr lang="en-US" dirty="0"/>
+          </a:p>
+        </p:txBody>
+      </p:sp>
+      <p:sp>
+        <p:nvSpPr>
+          <p:cNvPr id="4" name="Slide Number Placeholder 3"/>
+          <p:cNvSpPr>
+            <a:spLocks noGrp="1"/>
+          </p:cNvSpPr>
+          <p:nvPr>
+            <p:ph type="sldNum" sz="quarter" idx="10"/>
+          </p:nvPr>
+        </p:nvSpPr>
+        <p:spPr/>
+        <p:txBody>
+          <a:bodyPr/>
+          <a:lstStyle/>
+          <a:p>
+            <a:fld id="{B26A75E8-9EC7-42DF-8FCD-4AF46A032700}" type="slidenum">
+              <a:rPr lang="en-US" smtClean="0"/>
+              <a:pPr/>
+              <a:t>13</a:t>
             </a:fld>
             <a:endParaRPr lang="en-US"/>
           </a:p>
@@ -730,7 +1464,7 @@
             <a:fld id="{F57067B2-5D5B-4B98-9300-AE70A344D18E}" type="datetimeFigureOut">
               <a:rPr lang="en-US" smtClean="0"/>
               <a:pPr/>
-              <a:t>11/2/2010</a:t>
+              <a:t>11/16/2010</a:t>
             </a:fld>
             <a:endParaRPr lang="en-US"/>
           </a:p>
@@ -897,7 +1631,7 @@
             <a:fld id="{F57067B2-5D5B-4B98-9300-AE70A344D18E}" type="datetimeFigureOut">
               <a:rPr lang="en-US" smtClean="0"/>
               <a:pPr/>
-              <a:t>11/2/2010</a:t>
+              <a:t>11/16/2010</a:t>
             </a:fld>
             <a:endParaRPr lang="en-US"/>
           </a:p>
@@ -1074,7 +1808,7 @@
             <a:fld id="{F57067B2-5D5B-4B98-9300-AE70A344D18E}" type="datetimeFigureOut">
               <a:rPr lang="en-US" smtClean="0"/>
               <a:pPr/>
-              <a:t>11/2/2010</a:t>
+              <a:t>11/16/2010</a:t>
             </a:fld>
             <a:endParaRPr lang="en-US"/>
           </a:p>
@@ -1241,7 +1975,7 @@
             <a:fld id="{F57067B2-5D5B-4B98-9300-AE70A344D18E}" type="datetimeFigureOut">
               <a:rPr lang="en-US" smtClean="0"/>
               <a:pPr/>
-              <a:t>11/2/2010</a:t>
+              <a:t>11/16/2010</a:t>
             </a:fld>
             <a:endParaRPr lang="en-US"/>
           </a:p>
@@ -1484,7 +2218,7 @@
             <a:fld id="{F57067B2-5D5B-4B98-9300-AE70A344D18E}" type="datetimeFigureOut">
               <a:rPr lang="en-US" smtClean="0"/>
               <a:pPr/>
-              <a:t>11/2/2010</a:t>
+              <a:t>11/16/2010</a:t>
             </a:fld>
             <a:endParaRPr lang="en-US"/>
           </a:p>
@@ -1769,7 +2503,7 @@
             <a:fld id="{F57067B2-5D5B-4B98-9300-AE70A344D18E}" type="datetimeFigureOut">
               <a:rPr lang="en-US" smtClean="0"/>
               <a:pPr/>
-              <a:t>11/2/2010</a:t>
+              <a:t>11/16/2010</a:t>
             </a:fld>
             <a:endParaRPr lang="en-US"/>
           </a:p>
@@ -2188,7 +2922,7 @@
             <a:fld id="{F57067B2-5D5B-4B98-9300-AE70A344D18E}" type="datetimeFigureOut">
               <a:rPr lang="en-US" smtClean="0"/>
               <a:pPr/>
-              <a:t>11/2/2010</a:t>
+              <a:t>11/16/2010</a:t>
             </a:fld>
             <a:endParaRPr lang="en-US"/>
           </a:p>
@@ -2303,7 +3037,7 @@
             <a:fld id="{F57067B2-5D5B-4B98-9300-AE70A344D18E}" type="datetimeFigureOut">
               <a:rPr lang="en-US" smtClean="0"/>
               <a:pPr/>
-              <a:t>11/2/2010</a:t>
+              <a:t>11/16/2010</a:t>
             </a:fld>
             <a:endParaRPr lang="en-US"/>
           </a:p>
@@ -2395,7 +3129,7 @@
             <a:fld id="{F57067B2-5D5B-4B98-9300-AE70A344D18E}" type="datetimeFigureOut">
               <a:rPr lang="en-US" smtClean="0"/>
               <a:pPr/>
-              <a:t>11/2/2010</a:t>
+              <a:t>11/16/2010</a:t>
             </a:fld>
             <a:endParaRPr lang="en-US"/>
           </a:p>
@@ -2669,7 +3403,7 @@
             <a:fld id="{F57067B2-5D5B-4B98-9300-AE70A344D18E}" type="datetimeFigureOut">
               <a:rPr lang="en-US" smtClean="0"/>
               <a:pPr/>
-              <a:t>11/2/2010</a:t>
+              <a:t>11/16/2010</a:t>
             </a:fld>
             <a:endParaRPr lang="en-US"/>
           </a:p>
@@ -2919,7 +3653,7 @@
             <a:fld id="{F57067B2-5D5B-4B98-9300-AE70A344D18E}" type="datetimeFigureOut">
               <a:rPr lang="en-US" smtClean="0"/>
               <a:pPr/>
-              <a:t>11/2/2010</a:t>
+              <a:t>11/16/2010</a:t>
             </a:fld>
             <a:endParaRPr lang="en-US"/>
           </a:p>
@@ -3129,7 +3863,7 @@
             <a:fld id="{F57067B2-5D5B-4B98-9300-AE70A344D18E}" type="datetimeFigureOut">
               <a:rPr lang="en-US" smtClean="0"/>
               <a:pPr/>
-              <a:t>11/2/2010</a:t>
+              <a:t>11/16/2010</a:t>
             </a:fld>
             <a:endParaRPr lang="en-US"/>
           </a:p>
@@ -3509,7 +4243,7 @@
           <p:nvPr/>
         </p:nvPicPr>
         <p:blipFill>
-          <a:blip r:embed="rId2" cstate="print"/>
+          <a:blip r:embed="rId3" cstate="print"/>
           <a:stretch>
             <a:fillRect/>
           </a:stretch>
@@ -3538,67 +4272,6 @@
           </a:effectLst>
         </p:spPr>
       </p:pic>
-      <p:sp>
-        <p:nvSpPr>
-          <p:cNvPr id="5" name="TextBox 4"/>
-          <p:cNvSpPr txBox="1"/>
-          <p:nvPr/>
-        </p:nvSpPr>
-        <p:spPr>
-          <a:xfrm>
-            <a:off x="152400" y="5562600"/>
-            <a:ext cx="6858000" cy="523220"/>
-          </a:xfrm>
-          <a:prstGeom prst="rect">
-            <a:avLst/>
-          </a:prstGeom>
-          <a:noFill/>
-        </p:spPr>
-        <p:txBody>
-          <a:bodyPr wrap="square" rtlCol="0">
-            <a:spAutoFit/>
-          </a:bodyPr>
-          <a:lstStyle/>
-          <a:p>
-            <a:r>
-              <a:rPr lang="pt-BR" sz="2800" dirty="0" smtClean="0"/>
-              <a:t>Integração Contínua – Muito Além do Build</a:t>
-            </a:r>
-            <a:endParaRPr lang="en-US" sz="2800" dirty="0"/>
-          </a:p>
-        </p:txBody>
-      </p:sp>
-      <p:sp>
-        <p:nvSpPr>
-          <p:cNvPr id="6" name="TextBox 5"/>
-          <p:cNvSpPr txBox="1"/>
-          <p:nvPr/>
-        </p:nvSpPr>
-        <p:spPr>
-          <a:xfrm>
-            <a:off x="4572000" y="609600"/>
-            <a:ext cx="4495800" cy="253916"/>
-          </a:xfrm>
-          <a:prstGeom prst="rect">
-            <a:avLst/>
-          </a:prstGeom>
-          <a:noFill/>
-        </p:spPr>
-        <p:txBody>
-          <a:bodyPr wrap="square" rtlCol="0">
-            <a:spAutoFit/>
-          </a:bodyPr>
-          <a:lstStyle/>
-          <a:p>
-            <a:pPr algn="r"/>
-            <a:r>
-              <a:rPr lang="en-US" sz="1050" dirty="0" smtClean="0"/>
-              <a:t>http://www.lean6sigma.co.nz/integrating-continuous-improvement/</a:t>
-            </a:r>
-            <a:endParaRPr lang="en-US" sz="1050" dirty="0"/>
-          </a:p>
-        </p:txBody>
-      </p:sp>
     </p:spTree>
   </p:cSld>
   <p:clrMapOvr>
@@ -3614,7 +4287,102 @@
 </p:sld>
 </file>
 
-<file path=ppt/slides/slide2.xml><?xml version="1.0" encoding="utf-8"?>
+<file path=ppt/slides/slide10.xml><?xml version="1.0" encoding="utf-8"?>
+<p:sld xmlns:a="http://schemas.openxmlformats.org/drawingml/2006/main" xmlns:r="http://schemas.openxmlformats.org/officeDocument/2006/relationships" xmlns:p="http://schemas.openxmlformats.org/presentationml/2006/main">
+  <p:cSld>
+    <p:bg>
+      <p:bgPr>
+        <a:solidFill>
+          <a:schemeClr val="tx2">
+            <a:lumMod val="50000"/>
+          </a:schemeClr>
+        </a:solidFill>
+        <a:effectLst/>
+      </p:bgPr>
+    </p:bg>
+    <p:spTree>
+      <p:nvGrpSpPr>
+        <p:cNvPr id="1" name=""/>
+        <p:cNvGrpSpPr/>
+        <p:nvPr/>
+      </p:nvGrpSpPr>
+      <p:grpSpPr>
+        <a:xfrm>
+          <a:off x="0" y="0"/>
+          <a:ext cx="0" cy="0"/>
+          <a:chOff x="0" y="0"/>
+          <a:chExt cx="0" cy="0"/>
+        </a:xfrm>
+      </p:grpSpPr>
+      <p:sp>
+        <p:nvSpPr>
+          <p:cNvPr id="3" name="TextBox 2"/>
+          <p:cNvSpPr txBox="1"/>
+          <p:nvPr/>
+        </p:nvSpPr>
+        <p:spPr>
+          <a:xfrm>
+            <a:off x="0" y="2438400"/>
+            <a:ext cx="9144000" cy="1446550"/>
+          </a:xfrm>
+          <a:prstGeom prst="rect">
+            <a:avLst/>
+          </a:prstGeom>
+          <a:noFill/>
+        </p:spPr>
+        <p:txBody>
+          <a:bodyPr wrap="square" rtlCol="0">
+            <a:spAutoFit/>
+          </a:bodyPr>
+          <a:lstStyle/>
+          <a:p>
+            <a:pPr algn="ctr"/>
+            <a:r>
+              <a:rPr lang="pt-BR" sz="8800" dirty="0" err="1" smtClean="0">
+                <a:solidFill>
+                  <a:schemeClr val="bg1"/>
+                </a:solidFill>
+                <a:latin typeface="+mj-lt"/>
+                <a:cs typeface="Consolas" pitchFamily="49" charset="0"/>
+              </a:rPr>
+              <a:t>Ta-da</a:t>
+            </a:r>
+            <a:r>
+              <a:rPr lang="pt-BR" sz="8800" dirty="0" smtClean="0">
+                <a:solidFill>
+                  <a:schemeClr val="bg1"/>
+                </a:solidFill>
+                <a:latin typeface="+mj-lt"/>
+                <a:cs typeface="Consolas" pitchFamily="49" charset="0"/>
+              </a:rPr>
+              <a:t>!</a:t>
+            </a:r>
+            <a:endParaRPr lang="en-US" sz="8800" dirty="0">
+              <a:solidFill>
+                <a:schemeClr val="bg1"/>
+              </a:solidFill>
+              <a:latin typeface="+mj-lt"/>
+              <a:cs typeface="Consolas" pitchFamily="49" charset="0"/>
+            </a:endParaRPr>
+          </a:p>
+        </p:txBody>
+      </p:sp>
+    </p:spTree>
+  </p:cSld>
+  <p:clrMapOvr>
+    <a:masterClrMapping/>
+  </p:clrMapOvr>
+  <p:timing>
+    <p:tnLst>
+      <p:par>
+        <p:cTn id="1" dur="indefinite" restart="never" nodeType="tmRoot"/>
+      </p:par>
+    </p:tnLst>
+  </p:timing>
+</p:sld>
+</file>
+
+<file path=ppt/slides/slide11.xml><?xml version="1.0" encoding="utf-8"?>
 <p:sld xmlns:a="http://schemas.openxmlformats.org/drawingml/2006/main" xmlns:r="http://schemas.openxmlformats.org/officeDocument/2006/relationships" xmlns:p="http://schemas.openxmlformats.org/presentationml/2006/main">
   <p:cSld>
     <p:spTree>
@@ -3633,70 +4401,30 @@
       </p:grpSpPr>
       <p:pic>
         <p:nvPicPr>
-          <p:cNvPr id="4" name="Picture 3" descr="6.gif"/>
+          <p:cNvPr id="32772" name="Picture 4" descr="Step-one-have-too-many-tools-for-your-existing-st.jpg (560×420)"/>
           <p:cNvPicPr>
-            <a:picLocks noChangeAspect="1"/>
+            <a:picLocks noChangeAspect="1" noChangeArrowheads="1"/>
           </p:cNvPicPr>
           <p:nvPr/>
         </p:nvPicPr>
         <p:blipFill>
-          <a:blip r:embed="rId2" cstate="print"/>
+          <a:blip r:embed="rId3" cstate="print"/>
+          <a:srcRect/>
           <a:stretch>
             <a:fillRect/>
           </a:stretch>
         </p:blipFill>
-        <p:spPr>
+        <p:spPr bwMode="auto">
           <a:xfrm>
-            <a:off x="2667000" y="838200"/>
-            <a:ext cx="3810000" cy="3810000"/>
-          </a:xfrm>
-          <a:prstGeom prst="rect">
-            <a:avLst/>
-          </a:prstGeom>
-          <a:ln w="88900" cap="sq" cmpd="thickThin">
-            <a:solidFill>
-              <a:srgbClr val="000000"/>
-            </a:solidFill>
-            <a:prstDash val="solid"/>
-            <a:miter lim="800000"/>
-          </a:ln>
-          <a:effectLst>
-            <a:innerShdw blurRad="76200">
-              <a:srgbClr val="000000"/>
-            </a:innerShdw>
-          </a:effectLst>
-        </p:spPr>
-      </p:pic>
-      <p:sp>
-        <p:nvSpPr>
-          <p:cNvPr id="5" name="TextBox 4"/>
-          <p:cNvSpPr txBox="1"/>
-          <p:nvPr/>
-        </p:nvSpPr>
-        <p:spPr>
-          <a:xfrm>
-            <a:off x="2438400" y="4724400"/>
-            <a:ext cx="4267200" cy="1015663"/>
+            <a:off x="0" y="0"/>
+            <a:ext cx="9143998" cy="6858000"/>
           </a:xfrm>
           <a:prstGeom prst="rect">
             <a:avLst/>
           </a:prstGeom>
           <a:noFill/>
         </p:spPr>
-        <p:txBody>
-          <a:bodyPr wrap="square" rtlCol="0">
-            <a:spAutoFit/>
-          </a:bodyPr>
-          <a:lstStyle/>
-          <a:p>
-            <a:pPr algn="ctr"/>
-            <a:r>
-              <a:rPr lang="pt-BR" sz="6000" dirty="0" smtClean="0"/>
-              <a:t>Manuel</a:t>
-            </a:r>
-          </a:p>
-        </p:txBody>
-      </p:sp>
+      </p:pic>
     </p:spTree>
   </p:cSld>
   <p:clrMapOvr>
@@ -3712,7 +4440,355 @@
 </p:sld>
 </file>
 
-<file path=ppt/slides/slide3.xml><?xml version="1.0" encoding="utf-8"?>
+<file path=ppt/slides/slide12.xml><?xml version="1.0" encoding="utf-8"?>
+<p:sld xmlns:a="http://schemas.openxmlformats.org/drawingml/2006/main" xmlns:r="http://schemas.openxmlformats.org/officeDocument/2006/relationships" xmlns:p="http://schemas.openxmlformats.org/presentationml/2006/main">
+  <p:cSld>
+    <p:bg>
+      <p:bgPr>
+        <a:solidFill>
+          <a:schemeClr val="tx2">
+            <a:lumMod val="50000"/>
+          </a:schemeClr>
+        </a:solidFill>
+        <a:effectLst/>
+      </p:bgPr>
+    </p:bg>
+    <p:spTree>
+      <p:nvGrpSpPr>
+        <p:cNvPr id="1" name=""/>
+        <p:cNvGrpSpPr/>
+        <p:nvPr/>
+      </p:nvGrpSpPr>
+      <p:grpSpPr>
+        <a:xfrm>
+          <a:off x="0" y="0"/>
+          <a:ext cx="0" cy="0"/>
+          <a:chOff x="0" y="0"/>
+          <a:chExt cx="0" cy="0"/>
+        </a:xfrm>
+      </p:grpSpPr>
+      <p:pic>
+        <p:nvPicPr>
+          <p:cNvPr id="31746" name="Picture 2" descr="3384877145_97b7b495e1_o.png (250×268)"/>
+          <p:cNvPicPr>
+            <a:picLocks noChangeAspect="1" noChangeArrowheads="1"/>
+          </p:cNvPicPr>
+          <p:nvPr/>
+        </p:nvPicPr>
+        <p:blipFill>
+          <a:blip r:embed="rId3" cstate="print"/>
+          <a:srcRect/>
+          <a:stretch>
+            <a:fillRect/>
+          </a:stretch>
+        </p:blipFill>
+        <p:spPr bwMode="auto">
+          <a:xfrm>
+            <a:off x="381000" y="4305300"/>
+            <a:ext cx="2381250" cy="2552700"/>
+          </a:xfrm>
+          <a:prstGeom prst="rect">
+            <a:avLst/>
+          </a:prstGeom>
+          <a:noFill/>
+        </p:spPr>
+      </p:pic>
+      <p:pic>
+        <p:nvPicPr>
+          <p:cNvPr id="31748" name="Picture 4" descr="ccnet_logo.gif (235×54)"/>
+          <p:cNvPicPr>
+            <a:picLocks noChangeAspect="1" noChangeArrowheads="1"/>
+          </p:cNvPicPr>
+          <p:nvPr/>
+        </p:nvPicPr>
+        <p:blipFill>
+          <a:blip r:embed="rId4" cstate="print"/>
+          <a:srcRect/>
+          <a:stretch>
+            <a:fillRect/>
+          </a:stretch>
+        </p:blipFill>
+        <p:spPr bwMode="auto">
+          <a:xfrm>
+            <a:off x="4724400" y="990600"/>
+            <a:ext cx="3979326" cy="914400"/>
+          </a:xfrm>
+          <a:prstGeom prst="rect">
+            <a:avLst/>
+          </a:prstGeom>
+          <a:noFill/>
+        </p:spPr>
+      </p:pic>
+      <p:pic>
+        <p:nvPicPr>
+          <p:cNvPr id="31750" name="Picture 6" descr="resize (500×500)"/>
+          <p:cNvPicPr>
+            <a:picLocks noChangeAspect="1" noChangeArrowheads="1"/>
+          </p:cNvPicPr>
+          <p:nvPr/>
+        </p:nvPicPr>
+        <p:blipFill>
+          <a:blip r:embed="rId5" cstate="print"/>
+          <a:srcRect/>
+          <a:stretch>
+            <a:fillRect/>
+          </a:stretch>
+        </p:blipFill>
+        <p:spPr bwMode="auto">
+          <a:xfrm>
+            <a:off x="5181600" y="3352800"/>
+            <a:ext cx="2819400" cy="2819400"/>
+          </a:xfrm>
+          <a:prstGeom prst="rect">
+            <a:avLst/>
+          </a:prstGeom>
+          <a:noFill/>
+        </p:spPr>
+      </p:pic>
+      <p:pic>
+        <p:nvPicPr>
+          <p:cNvPr id="31752" name="Picture 8" descr="teamcity512.png (512×512)"/>
+          <p:cNvPicPr>
+            <a:picLocks noChangeAspect="1" noChangeArrowheads="1"/>
+          </p:cNvPicPr>
+          <p:nvPr/>
+        </p:nvPicPr>
+        <p:blipFill>
+          <a:blip r:embed="rId6" cstate="print"/>
+          <a:srcRect/>
+          <a:stretch>
+            <a:fillRect/>
+          </a:stretch>
+        </p:blipFill>
+        <p:spPr bwMode="auto">
+          <a:xfrm>
+            <a:off x="990600" y="533400"/>
+            <a:ext cx="2590798" cy="2590799"/>
+          </a:xfrm>
+          <a:prstGeom prst="rect">
+            <a:avLst/>
+          </a:prstGeom>
+          <a:noFill/>
+        </p:spPr>
+      </p:pic>
+    </p:spTree>
+  </p:cSld>
+  <p:clrMapOvr>
+    <a:masterClrMapping/>
+  </p:clrMapOvr>
+  <p:timing>
+    <p:tnLst>
+      <p:par>
+        <p:cTn id="1" dur="indefinite" restart="never" nodeType="tmRoot"/>
+      </p:par>
+    </p:tnLst>
+  </p:timing>
+</p:sld>
+</file>
+
+<file path=ppt/slides/slide13.xml><?xml version="1.0" encoding="utf-8"?>
+<p:sld xmlns:a="http://schemas.openxmlformats.org/drawingml/2006/main" xmlns:r="http://schemas.openxmlformats.org/officeDocument/2006/relationships" xmlns:p="http://schemas.openxmlformats.org/presentationml/2006/main">
+  <p:cSld>
+    <p:bg>
+      <p:bgPr>
+        <a:solidFill>
+          <a:schemeClr val="tx2">
+            <a:lumMod val="50000"/>
+          </a:schemeClr>
+        </a:solidFill>
+        <a:effectLst/>
+      </p:bgPr>
+    </p:bg>
+    <p:spTree>
+      <p:nvGrpSpPr>
+        <p:cNvPr id="1" name=""/>
+        <p:cNvGrpSpPr/>
+        <p:nvPr/>
+      </p:nvGrpSpPr>
+      <p:grpSpPr>
+        <a:xfrm>
+          <a:off x="0" y="0"/>
+          <a:ext cx="0" cy="0"/>
+          <a:chOff x="0" y="0"/>
+          <a:chExt cx="0" cy="0"/>
+        </a:xfrm>
+      </p:grpSpPr>
+      <p:pic>
+        <p:nvPicPr>
+          <p:cNvPr id="35848" name="Picture 8" descr="landscape-cruise-diagram.jpg (400×283)"/>
+          <p:cNvPicPr>
+            <a:picLocks noChangeAspect="1" noChangeArrowheads="1"/>
+          </p:cNvPicPr>
+          <p:nvPr/>
+        </p:nvPicPr>
+        <p:blipFill>
+          <a:blip r:embed="rId3" cstate="print"/>
+          <a:srcRect/>
+          <a:stretch>
+            <a:fillRect/>
+          </a:stretch>
+        </p:blipFill>
+        <p:spPr bwMode="auto">
+          <a:xfrm>
+            <a:off x="228600" y="304800"/>
+            <a:ext cx="8723954" cy="6172200"/>
+          </a:xfrm>
+          <a:prstGeom prst="rect">
+            <a:avLst/>
+          </a:prstGeom>
+          <a:noFill/>
+        </p:spPr>
+      </p:pic>
+    </p:spTree>
+  </p:cSld>
+  <p:clrMapOvr>
+    <a:masterClrMapping/>
+  </p:clrMapOvr>
+  <p:timing>
+    <p:tnLst>
+      <p:par>
+        <p:cTn id="1" dur="indefinite" restart="never" nodeType="tmRoot"/>
+      </p:par>
+    </p:tnLst>
+  </p:timing>
+</p:sld>
+</file>
+
+<file path=ppt/slides/slide14.xml><?xml version="1.0" encoding="utf-8"?>
+<p:sld xmlns:a="http://schemas.openxmlformats.org/drawingml/2006/main" xmlns:r="http://schemas.openxmlformats.org/officeDocument/2006/relationships" xmlns:p="http://schemas.openxmlformats.org/presentationml/2006/main">
+  <p:cSld>
+    <p:bg>
+      <p:bgPr>
+        <a:solidFill>
+          <a:schemeClr val="tx2">
+            <a:lumMod val="50000"/>
+          </a:schemeClr>
+        </a:solidFill>
+        <a:effectLst/>
+      </p:bgPr>
+    </p:bg>
+    <p:spTree>
+      <p:nvGrpSpPr>
+        <p:cNvPr id="1" name=""/>
+        <p:cNvGrpSpPr/>
+        <p:nvPr/>
+      </p:nvGrpSpPr>
+      <p:grpSpPr>
+        <a:xfrm>
+          <a:off x="0" y="0"/>
+          <a:ext cx="0" cy="0"/>
+          <a:chOff x="0" y="0"/>
+          <a:chExt cx="0" cy="0"/>
+        </a:xfrm>
+      </p:grpSpPr>
+      <p:pic>
+        <p:nvPicPr>
+          <p:cNvPr id="4" name="Picture 4" descr="ccnet_logo.gif (235×54)"/>
+          <p:cNvPicPr>
+            <a:picLocks noChangeAspect="1" noChangeArrowheads="1"/>
+          </p:cNvPicPr>
+          <p:nvPr/>
+        </p:nvPicPr>
+        <p:blipFill>
+          <a:blip r:embed="rId2" cstate="print"/>
+          <a:srcRect/>
+          <a:stretch>
+            <a:fillRect/>
+          </a:stretch>
+        </p:blipFill>
+        <p:spPr bwMode="auto">
+          <a:xfrm>
+            <a:off x="2514600" y="3200400"/>
+            <a:ext cx="3979326" cy="914400"/>
+          </a:xfrm>
+          <a:prstGeom prst="rect">
+            <a:avLst/>
+          </a:prstGeom>
+          <a:noFill/>
+        </p:spPr>
+      </p:pic>
+      <p:sp>
+        <p:nvSpPr>
+          <p:cNvPr id="5" name="TextBox 4"/>
+          <p:cNvSpPr txBox="1"/>
+          <p:nvPr/>
+        </p:nvSpPr>
+        <p:spPr>
+          <a:xfrm>
+            <a:off x="0" y="1752600"/>
+            <a:ext cx="9144000" cy="1323439"/>
+          </a:xfrm>
+          <a:prstGeom prst="rect">
+            <a:avLst/>
+          </a:prstGeom>
+          <a:noFill/>
+        </p:spPr>
+        <p:txBody>
+          <a:bodyPr wrap="square" rtlCol="0">
+            <a:spAutoFit/>
+          </a:bodyPr>
+          <a:lstStyle/>
+          <a:p>
+            <a:pPr algn="ctr"/>
+            <a:r>
+              <a:rPr lang="pt-BR" sz="8000" dirty="0" smtClean="0">
+                <a:solidFill>
+                  <a:schemeClr val="bg1"/>
+                </a:solidFill>
+                <a:cs typeface="Consolas" pitchFamily="49" charset="0"/>
+              </a:rPr>
+              <a:t>Não é sobre</a:t>
+            </a:r>
+            <a:endParaRPr lang="en-US" sz="8000" dirty="0">
+              <a:solidFill>
+                <a:schemeClr val="bg1"/>
+              </a:solidFill>
+              <a:cs typeface="Consolas" pitchFamily="49" charset="0"/>
+            </a:endParaRPr>
+          </a:p>
+        </p:txBody>
+      </p:sp>
+    </p:spTree>
+  </p:cSld>
+  <p:clrMapOvr>
+    <a:masterClrMapping/>
+  </p:clrMapOvr>
+  <p:timing>
+    <p:tnLst>
+      <p:par>
+        <p:cTn id="1" dur="indefinite" restart="never" nodeType="tmRoot"/>
+      </p:par>
+    </p:tnLst>
+  </p:timing>
+</p:sld>
+</file>
+
+<file path=ppt/slides/slide15.xml><?xml version="1.0" encoding="utf-8"?>
+<p:sld xmlns:a="http://schemas.openxmlformats.org/drawingml/2006/main" xmlns:r="http://schemas.openxmlformats.org/officeDocument/2006/relationships" xmlns:p="http://schemas.openxmlformats.org/presentationml/2006/main">
+  <p:cSld>
+    <p:spTree>
+      <p:nvGrpSpPr>
+        <p:cNvPr id="1" name=""/>
+        <p:cNvGrpSpPr/>
+        <p:nvPr/>
+      </p:nvGrpSpPr>
+      <p:grpSpPr>
+        <a:xfrm>
+          <a:off x="0" y="0"/>
+          <a:ext cx="0" cy="0"/>
+          <a:chOff x="0" y="0"/>
+          <a:chExt cx="0" cy="0"/>
+        </a:xfrm>
+      </p:grpSpPr>
+    </p:spTree>
+  </p:cSld>
+  <p:clrMapOvr>
+    <a:masterClrMapping/>
+  </p:clrMapOvr>
+</p:sld>
+</file>
+
+<file path=ppt/slides/slide2.xml><?xml version="1.0" encoding="utf-8"?>
 <p:sld xmlns:a="http://schemas.openxmlformats.org/drawingml/2006/main" xmlns:r="http://schemas.openxmlformats.org/officeDocument/2006/relationships" xmlns:p="http://schemas.openxmlformats.org/presentationml/2006/main">
   <p:cSld>
     <p:bg>
@@ -3737,92 +4813,167 @@
           <a:chExt cx="0" cy="0"/>
         </a:xfrm>
       </p:grpSpPr>
+      <p:sp>
+        <p:nvSpPr>
+          <p:cNvPr id="4" name="TextBox 3"/>
+          <p:cNvSpPr txBox="1"/>
+          <p:nvPr/>
+        </p:nvSpPr>
+        <p:spPr>
+          <a:xfrm>
+            <a:off x="533400" y="1524000"/>
+            <a:ext cx="8382000" cy="3416320"/>
+          </a:xfrm>
+          <a:prstGeom prst="rect">
+            <a:avLst/>
+          </a:prstGeom>
+          <a:noFill/>
+        </p:spPr>
+        <p:txBody>
+          <a:bodyPr wrap="square" rtlCol="0">
+            <a:spAutoFit/>
+          </a:bodyPr>
+          <a:lstStyle/>
+          <a:p>
+            <a:r>
+              <a:rPr lang="pt-BR" sz="5400" dirty="0" smtClean="0">
+                <a:solidFill>
+                  <a:schemeClr val="bg1"/>
+                </a:solidFill>
+                <a:latin typeface="Consolas" pitchFamily="49" charset="0"/>
+                <a:cs typeface="Consolas" pitchFamily="49" charset="0"/>
+              </a:rPr>
+              <a:t>Juan Lopes</a:t>
+            </a:r>
+          </a:p>
+          <a:p>
+            <a:r>
+              <a:rPr lang="pt-BR" sz="5400" dirty="0" smtClean="0">
+                <a:solidFill>
+                  <a:schemeClr val="bg1"/>
+                </a:solidFill>
+                <a:latin typeface="Consolas" pitchFamily="49" charset="0"/>
+                <a:cs typeface="Consolas" pitchFamily="49" charset="0"/>
+              </a:rPr>
+              <a:t>Humano</a:t>
+            </a:r>
+          </a:p>
+          <a:p>
+            <a:r>
+              <a:rPr lang="pt-BR" sz="5400" dirty="0" smtClean="0">
+                <a:solidFill>
+                  <a:schemeClr val="bg1"/>
+                </a:solidFill>
+                <a:latin typeface="Consolas" pitchFamily="49" charset="0"/>
+                <a:cs typeface="Consolas" pitchFamily="49" charset="0"/>
+              </a:rPr>
+              <a:t>@</a:t>
+            </a:r>
+            <a:r>
+              <a:rPr lang="pt-BR" sz="5400" dirty="0" err="1" smtClean="0">
+                <a:solidFill>
+                  <a:schemeClr val="bg1"/>
+                </a:solidFill>
+                <a:latin typeface="Consolas" pitchFamily="49" charset="0"/>
+                <a:cs typeface="Consolas" pitchFamily="49" charset="0"/>
+              </a:rPr>
+              <a:t>juanplopes</a:t>
+            </a:r>
+            <a:endParaRPr lang="pt-BR" sz="5400" dirty="0" smtClean="0">
+              <a:solidFill>
+                <a:schemeClr val="bg1"/>
+              </a:solidFill>
+              <a:latin typeface="Consolas" pitchFamily="49" charset="0"/>
+              <a:cs typeface="Consolas" pitchFamily="49" charset="0"/>
+            </a:endParaRPr>
+          </a:p>
+          <a:p>
+            <a:r>
+              <a:rPr lang="pt-BR" sz="5400" dirty="0" smtClean="0">
+                <a:solidFill>
+                  <a:schemeClr val="bg1"/>
+                </a:solidFill>
+                <a:latin typeface="Consolas" pitchFamily="49" charset="0"/>
+                <a:cs typeface="Consolas" pitchFamily="49" charset="0"/>
+              </a:rPr>
+              <a:t>github.com/</a:t>
+            </a:r>
+            <a:r>
+              <a:rPr lang="pt-BR" sz="5400" dirty="0" err="1" smtClean="0">
+                <a:solidFill>
+                  <a:schemeClr val="bg1"/>
+                </a:solidFill>
+                <a:latin typeface="Consolas" pitchFamily="49" charset="0"/>
+                <a:cs typeface="Consolas" pitchFamily="49" charset="0"/>
+              </a:rPr>
+              <a:t>juanplopes</a:t>
+            </a:r>
+            <a:endParaRPr lang="pt-BR" sz="5400" dirty="0" smtClean="0">
+              <a:solidFill>
+                <a:schemeClr val="bg1"/>
+              </a:solidFill>
+              <a:latin typeface="Consolas" pitchFamily="49" charset="0"/>
+              <a:cs typeface="Consolas" pitchFamily="49" charset="0"/>
+            </a:endParaRPr>
+          </a:p>
+        </p:txBody>
+      </p:sp>
+    </p:spTree>
+  </p:cSld>
+  <p:clrMapOvr>
+    <a:masterClrMapping/>
+  </p:clrMapOvr>
+  <p:timing>
+    <p:tnLst>
+      <p:par>
+        <p:cTn id="1" dur="indefinite" restart="never" nodeType="tmRoot"/>
+      </p:par>
+    </p:tnLst>
+  </p:timing>
+</p:sld>
+</file>
+
+<file path=ppt/slides/slide3.xml><?xml version="1.0" encoding="utf-8"?>
+<p:sld xmlns:a="http://schemas.openxmlformats.org/drawingml/2006/main" xmlns:r="http://schemas.openxmlformats.org/officeDocument/2006/relationships" xmlns:p="http://schemas.openxmlformats.org/presentationml/2006/main">
+  <p:cSld>
+    <p:spTree>
+      <p:nvGrpSpPr>
+        <p:cNvPr id="1" name=""/>
+        <p:cNvGrpSpPr/>
+        <p:nvPr/>
+      </p:nvGrpSpPr>
+      <p:grpSpPr>
+        <a:xfrm>
+          <a:off x="0" y="0"/>
+          <a:ext cx="0" cy="0"/>
+          <a:chOff x="0" y="0"/>
+          <a:chExt cx="0" cy="0"/>
+        </a:xfrm>
+      </p:grpSpPr>
       <p:pic>
         <p:nvPicPr>
-          <p:cNvPr id="4" name="Picture 3" descr="6.gif"/>
+          <p:cNvPr id="4" name="Picture 3" descr="9.jpg"/>
           <p:cNvPicPr>
             <a:picLocks noChangeAspect="1"/>
           </p:cNvPicPr>
           <p:nvPr/>
         </p:nvPicPr>
         <p:blipFill>
-          <a:blip r:embed="rId2" cstate="print"/>
+          <a:blip r:embed="rId3" cstate="print"/>
           <a:stretch>
             <a:fillRect/>
           </a:stretch>
         </p:blipFill>
         <p:spPr>
           <a:xfrm>
-            <a:off x="2667000" y="838200"/>
-            <a:ext cx="3810000" cy="3810000"/>
+            <a:off x="555434" y="761999"/>
+            <a:ext cx="8283766" cy="5500421"/>
           </a:xfrm>
           <a:prstGeom prst="rect">
             <a:avLst/>
           </a:prstGeom>
-          <a:ln w="88900" cap="sq" cmpd="thickThin">
-            <a:solidFill>
-              <a:srgbClr val="000000"/>
-            </a:solidFill>
-            <a:prstDash val="solid"/>
-            <a:miter lim="800000"/>
-          </a:ln>
-          <a:effectLst>
-            <a:innerShdw blurRad="76200">
-              <a:srgbClr val="000000"/>
-            </a:innerShdw>
-          </a:effectLst>
         </p:spPr>
       </p:pic>
-      <p:sp>
-        <p:nvSpPr>
-          <p:cNvPr id="5" name="TextBox 4"/>
-          <p:cNvSpPr txBox="1"/>
-          <p:nvPr/>
-        </p:nvSpPr>
-        <p:spPr>
-          <a:xfrm>
-            <a:off x="2438400" y="4724400"/>
-            <a:ext cx="4267200" cy="1938992"/>
-          </a:xfrm>
-          <a:prstGeom prst="rect">
-            <a:avLst/>
-          </a:prstGeom>
-          <a:noFill/>
-        </p:spPr>
-        <p:txBody>
-          <a:bodyPr wrap="square" rtlCol="0">
-            <a:spAutoFit/>
-          </a:bodyPr>
-          <a:lstStyle/>
-          <a:p>
-            <a:pPr algn="ctr"/>
-            <a:r>
-              <a:rPr lang="pt-BR" sz="6000" dirty="0" smtClean="0">
-                <a:solidFill>
-                  <a:schemeClr val="bg1"/>
-                </a:solidFill>
-              </a:rPr>
-              <a:t>Manuel</a:t>
-            </a:r>
-          </a:p>
-          <a:p>
-            <a:pPr algn="ctr"/>
-            <a:r>
-              <a:rPr lang="en-US" sz="6000" dirty="0" err="1" smtClean="0">
-                <a:solidFill>
-                  <a:schemeClr val="bg1"/>
-                </a:solidFill>
-              </a:rPr>
-              <a:t>Jakobsen</a:t>
-            </a:r>
-            <a:endParaRPr lang="en-US" sz="6000" dirty="0">
-              <a:solidFill>
-                <a:schemeClr val="bg1"/>
-              </a:solidFill>
-            </a:endParaRPr>
-          </a:p>
-        </p:txBody>
-      </p:sp>
     </p:spTree>
   </p:cSld>
   <p:clrMapOvr>
@@ -3857,14 +5008,14 @@
       </p:grpSpPr>
       <p:pic>
         <p:nvPicPr>
-          <p:cNvPr id="4" name="Picture 3" descr="7.gif"/>
+          <p:cNvPr id="4" name="Picture 3" descr="10.jpg"/>
           <p:cNvPicPr>
             <a:picLocks noChangeAspect="1"/>
           </p:cNvPicPr>
           <p:nvPr/>
         </p:nvPicPr>
         <p:blipFill>
-          <a:blip r:embed="rId2" cstate="print"/>
+          <a:blip r:embed="rId3" cstate="print"/>
           <a:stretch>
             <a:fillRect/>
           </a:stretch>
@@ -3879,45 +5030,6 @@
           </a:prstGeom>
         </p:spPr>
       </p:pic>
-      <p:sp>
-        <p:nvSpPr>
-          <p:cNvPr id="5" name="TextBox 4"/>
-          <p:cNvSpPr txBox="1"/>
-          <p:nvPr/>
-        </p:nvSpPr>
-        <p:spPr>
-          <a:xfrm>
-            <a:off x="5943600" y="0"/>
-            <a:ext cx="3200400" cy="246221"/>
-          </a:xfrm>
-          <a:prstGeom prst="rect">
-            <a:avLst/>
-          </a:prstGeom>
-          <a:noFill/>
-        </p:spPr>
-        <p:txBody>
-          <a:bodyPr wrap="square" rtlCol="0">
-            <a:spAutoFit/>
-          </a:bodyPr>
-          <a:lstStyle/>
-          <a:p>
-            <a:pPr algn="r"/>
-            <a:r>
-              <a:rPr lang="en-US" sz="1000" dirty="0" smtClean="0">
-                <a:solidFill>
-                  <a:schemeClr val="bg1"/>
-                </a:solidFill>
-              </a:rPr>
-              <a:t>http://www.embl.org/elmi/images/denmark.gif</a:t>
-            </a:r>
-            <a:endParaRPr lang="en-US" sz="1000" dirty="0">
-              <a:solidFill>
-                <a:schemeClr val="bg1"/>
-              </a:solidFill>
-            </a:endParaRPr>
-          </a:p>
-        </p:txBody>
-      </p:sp>
     </p:spTree>
   </p:cSld>
   <p:clrMapOvr>
@@ -3936,181 +5048,12 @@
 <file path=ppt/slides/slide5.xml><?xml version="1.0" encoding="utf-8"?>
 <p:sld xmlns:a="http://schemas.openxmlformats.org/drawingml/2006/main" xmlns:r="http://schemas.openxmlformats.org/officeDocument/2006/relationships" xmlns:p="http://schemas.openxmlformats.org/presentationml/2006/main">
   <p:cSld>
-    <p:spTree>
-      <p:nvGrpSpPr>
-        <p:cNvPr id="1" name=""/>
-        <p:cNvGrpSpPr/>
-        <p:nvPr/>
-      </p:nvGrpSpPr>
-      <p:grpSpPr>
-        <a:xfrm>
-          <a:off x="0" y="0"/>
-          <a:ext cx="0" cy="0"/>
-          <a:chOff x="0" y="0"/>
-          <a:chExt cx="0" cy="0"/>
-        </a:xfrm>
-      </p:grpSpPr>
-      <p:pic>
-        <p:nvPicPr>
-          <p:cNvPr id="4" name="Picture 3" descr="8.jpg"/>
-          <p:cNvPicPr>
-            <a:picLocks noChangeAspect="1"/>
-          </p:cNvPicPr>
-          <p:nvPr/>
-        </p:nvPicPr>
-        <p:blipFill>
-          <a:blip r:embed="rId2" cstate="print"/>
-          <a:stretch>
-            <a:fillRect/>
-          </a:stretch>
-        </p:blipFill>
-        <p:spPr>
-          <a:xfrm>
-            <a:off x="0" y="0"/>
-            <a:ext cx="9144000" cy="6858000"/>
-          </a:xfrm>
-          <a:prstGeom prst="rect">
-            <a:avLst/>
-          </a:prstGeom>
-        </p:spPr>
-      </p:pic>
-      <p:sp>
-        <p:nvSpPr>
-          <p:cNvPr id="5" name="Rectangle 4"/>
-          <p:cNvSpPr/>
-          <p:nvPr/>
-        </p:nvSpPr>
-        <p:spPr>
-          <a:xfrm>
-            <a:off x="5334000" y="6611779"/>
-            <a:ext cx="4572000" cy="246221"/>
-          </a:xfrm>
-          <a:prstGeom prst="rect">
-            <a:avLst/>
-          </a:prstGeom>
-        </p:spPr>
-        <p:txBody>
-          <a:bodyPr>
-            <a:spAutoFit/>
-          </a:bodyPr>
-          <a:lstStyle/>
-          <a:p>
-            <a:r>
-              <a:rPr lang="en-US" sz="1000" dirty="0" smtClean="0"/>
-              <a:t>http://nutribrazil.com/wp-content/uploads/2010/03/bacalhau011.jpg</a:t>
-            </a:r>
-            <a:endParaRPr lang="en-US" sz="1000" dirty="0"/>
-          </a:p>
-        </p:txBody>
-      </p:sp>
-    </p:spTree>
-  </p:cSld>
-  <p:clrMapOvr>
-    <a:masterClrMapping/>
-  </p:clrMapOvr>
-  <p:timing>
-    <p:tnLst>
-      <p:par>
-        <p:cTn id="1" dur="indefinite" restart="never" nodeType="tmRoot"/>
-      </p:par>
-    </p:tnLst>
-  </p:timing>
-</p:sld>
-</file>
-
-<file path=ppt/slides/slide6.xml><?xml version="1.0" encoding="utf-8"?>
-<p:sld xmlns:a="http://schemas.openxmlformats.org/drawingml/2006/main" xmlns:r="http://schemas.openxmlformats.org/officeDocument/2006/relationships" xmlns:p="http://schemas.openxmlformats.org/presentationml/2006/main">
-  <p:cSld>
-    <p:spTree>
-      <p:nvGrpSpPr>
-        <p:cNvPr id="1" name=""/>
-        <p:cNvGrpSpPr/>
-        <p:nvPr/>
-      </p:nvGrpSpPr>
-      <p:grpSpPr>
-        <a:xfrm>
-          <a:off x="0" y="0"/>
-          <a:ext cx="0" cy="0"/>
-          <a:chOff x="0" y="0"/>
-          <a:chExt cx="0" cy="0"/>
-        </a:xfrm>
-      </p:grpSpPr>
-      <p:pic>
-        <p:nvPicPr>
-          <p:cNvPr id="4" name="Picture 3" descr="5.jpg"/>
-          <p:cNvPicPr>
-            <a:picLocks noChangeAspect="1"/>
-          </p:cNvPicPr>
-          <p:nvPr/>
-        </p:nvPicPr>
-        <p:blipFill>
-          <a:blip r:embed="rId2" cstate="print"/>
-          <a:stretch>
-            <a:fillRect/>
-          </a:stretch>
-        </p:blipFill>
-        <p:spPr>
-          <a:xfrm>
-            <a:off x="0" y="0"/>
-            <a:ext cx="9144000" cy="6882938"/>
-          </a:xfrm>
-          <a:prstGeom prst="rect">
-            <a:avLst/>
-          </a:prstGeom>
-        </p:spPr>
-      </p:pic>
-      <p:sp>
-        <p:nvSpPr>
-          <p:cNvPr id="5" name="TextBox 4"/>
-          <p:cNvSpPr txBox="1"/>
-          <p:nvPr/>
-        </p:nvSpPr>
-        <p:spPr>
-          <a:xfrm>
-            <a:off x="0" y="0"/>
-            <a:ext cx="4161717" cy="246221"/>
-          </a:xfrm>
-          <a:prstGeom prst="rect">
-            <a:avLst/>
-          </a:prstGeom>
-          <a:noFill/>
-        </p:spPr>
-        <p:txBody>
-          <a:bodyPr wrap="none" rtlCol="0">
-            <a:spAutoFit/>
-          </a:bodyPr>
-          <a:lstStyle/>
-          <a:p>
-            <a:r>
-              <a:rPr lang="en-US" sz="1000" dirty="0" smtClean="0"/>
-              <a:t>http://www.rebelado.com/wp-content/uploads/2008/03/foto_bacalhau.jpg</a:t>
-            </a:r>
-            <a:endParaRPr lang="en-US" sz="1000" dirty="0"/>
-          </a:p>
-        </p:txBody>
-      </p:sp>
-    </p:spTree>
-  </p:cSld>
-  <p:clrMapOvr>
-    <a:masterClrMapping/>
-  </p:clrMapOvr>
-  <p:timing>
-    <p:tnLst>
-      <p:par>
-        <p:cTn id="1" dur="indefinite" restart="never" nodeType="tmRoot"/>
-      </p:par>
-    </p:tnLst>
-  </p:timing>
-</p:sld>
-</file>
-
-<file path=ppt/slides/slide7.xml><?xml version="1.0" encoding="utf-8"?>
-<p:sld xmlns:a="http://schemas.openxmlformats.org/drawingml/2006/main" xmlns:r="http://schemas.openxmlformats.org/officeDocument/2006/relationships" xmlns:p="http://schemas.openxmlformats.org/presentationml/2006/main">
-  <p:cSld>
     <p:bg>
       <p:bgPr>
         <a:solidFill>
-          <a:schemeClr val="tx2"/>
+          <a:schemeClr val="tx2">
+            <a:lumMod val="50000"/>
+          </a:schemeClr>
         </a:solidFill>
         <a:effectLst/>
       </p:bgPr>
@@ -4129,431 +5072,66 @@
           <a:chExt cx="0" cy="0"/>
         </a:xfrm>
       </p:grpSpPr>
-      <p:sp>
-        <p:nvSpPr>
-          <p:cNvPr id="4" name="TextBox 3"/>
-          <p:cNvSpPr txBox="1"/>
+      <p:pic>
+        <p:nvPicPr>
+          <p:cNvPr id="1026" name="Picture 2"/>
+          <p:cNvPicPr>
+            <a:picLocks noChangeAspect="1" noChangeArrowheads="1"/>
+          </p:cNvPicPr>
           <p:nvPr/>
-        </p:nvSpPr>
-        <p:spPr>
+        </p:nvPicPr>
+        <p:blipFill>
+          <a:blip r:embed="rId2" cstate="print"/>
+          <a:srcRect/>
+          <a:stretch>
+            <a:fillRect/>
+          </a:stretch>
+        </p:blipFill>
+        <p:spPr bwMode="auto">
           <a:xfrm>
-            <a:off x="685800" y="1752600"/>
-            <a:ext cx="7924800" cy="2585323"/>
+            <a:off x="0" y="457200"/>
+            <a:ext cx="9143999" cy="5140989"/>
+          </a:xfrm>
+          <a:prstGeom prst="rect">
+            <a:avLst/>
+          </a:prstGeom>
+          <a:noFill/>
+          <a:ln w="9525">
+            <a:noFill/>
+            <a:miter lim="800000"/>
+            <a:headEnd/>
+            <a:tailEnd/>
+          </a:ln>
+        </p:spPr>
+      </p:pic>
+      <p:pic>
+        <p:nvPicPr>
+          <p:cNvPr id="1032" name="Picture 8" descr="Mute.png (128×128)"/>
+          <p:cNvPicPr>
+            <a:picLocks noChangeAspect="1" noChangeArrowheads="1"/>
+          </p:cNvPicPr>
+          <p:nvPr/>
+        </p:nvPicPr>
+        <p:blipFill>
+          <a:blip r:embed="rId3" cstate="print">
+            <a:lum bright="70000" contrast="-70000"/>
+          </a:blip>
+          <a:srcRect/>
+          <a:stretch>
+            <a:fillRect/>
+          </a:stretch>
+        </p:blipFill>
+        <p:spPr bwMode="auto">
+          <a:xfrm>
+            <a:off x="7772400" y="5638799"/>
+            <a:ext cx="1219200" cy="1219201"/>
           </a:xfrm>
           <a:prstGeom prst="rect">
             <a:avLst/>
           </a:prstGeom>
           <a:noFill/>
         </p:spPr>
-        <p:txBody>
-          <a:bodyPr wrap="square" rtlCol="0">
-            <a:spAutoFit/>
-          </a:bodyPr>
-          <a:lstStyle/>
-          <a:p>
-            <a:r>
-              <a:rPr lang="en-US" b="1" dirty="0" smtClean="0">
-                <a:solidFill>
-                  <a:schemeClr val="bg1"/>
-                </a:solidFill>
-                <a:latin typeface="Consolas" pitchFamily="49" charset="0"/>
-                <a:cs typeface="Consolas" pitchFamily="49" charset="0"/>
-              </a:rPr>
-              <a:t>public</a:t>
-            </a:r>
-            <a:r>
-              <a:rPr lang="en-US" dirty="0" smtClean="0">
-                <a:solidFill>
-                  <a:schemeClr val="bg1"/>
-                </a:solidFill>
-                <a:latin typeface="Consolas" pitchFamily="49" charset="0"/>
-                <a:cs typeface="Consolas" pitchFamily="49" charset="0"/>
-              </a:rPr>
-              <a:t> </a:t>
-            </a:r>
-            <a:r>
-              <a:rPr lang="en-US" b="1" dirty="0" smtClean="0">
-                <a:solidFill>
-                  <a:schemeClr val="bg1"/>
-                </a:solidFill>
-                <a:latin typeface="Consolas" pitchFamily="49" charset="0"/>
-                <a:cs typeface="Consolas" pitchFamily="49" charset="0"/>
-              </a:rPr>
-              <a:t>static</a:t>
-            </a:r>
-            <a:r>
-              <a:rPr lang="en-US" dirty="0" smtClean="0">
-                <a:solidFill>
-                  <a:schemeClr val="bg1"/>
-                </a:solidFill>
-                <a:latin typeface="Consolas" pitchFamily="49" charset="0"/>
-                <a:cs typeface="Consolas" pitchFamily="49" charset="0"/>
-              </a:rPr>
-              <a:t> </a:t>
-            </a:r>
-            <a:r>
-              <a:rPr lang="en-US" b="1" dirty="0" smtClean="0">
-                <a:solidFill>
-                  <a:schemeClr val="bg1"/>
-                </a:solidFill>
-                <a:latin typeface="Consolas" pitchFamily="49" charset="0"/>
-                <a:cs typeface="Consolas" pitchFamily="49" charset="0"/>
-              </a:rPr>
-              <a:t>string</a:t>
-            </a:r>
-            <a:r>
-              <a:rPr lang="en-US" dirty="0" smtClean="0">
-                <a:solidFill>
-                  <a:schemeClr val="bg1"/>
-                </a:solidFill>
-                <a:latin typeface="Consolas" pitchFamily="49" charset="0"/>
-                <a:cs typeface="Consolas" pitchFamily="49" charset="0"/>
-              </a:rPr>
-              <a:t> Bool2Str(</a:t>
-            </a:r>
-            <a:r>
-              <a:rPr lang="en-US" b="1" dirty="0" err="1" smtClean="0">
-                <a:solidFill>
-                  <a:schemeClr val="bg1"/>
-                </a:solidFill>
-                <a:latin typeface="Consolas" pitchFamily="49" charset="0"/>
-                <a:cs typeface="Consolas" pitchFamily="49" charset="0"/>
-              </a:rPr>
-              <a:t>bool</a:t>
-            </a:r>
-            <a:r>
-              <a:rPr lang="en-US" dirty="0" smtClean="0">
-                <a:solidFill>
-                  <a:schemeClr val="bg1"/>
-                </a:solidFill>
-                <a:latin typeface="Consolas" pitchFamily="49" charset="0"/>
-                <a:cs typeface="Consolas" pitchFamily="49" charset="0"/>
-              </a:rPr>
-              <a:t> b) </a:t>
-            </a:r>
-          </a:p>
-          <a:p>
-            <a:r>
-              <a:rPr lang="en-US" dirty="0" smtClean="0">
-                <a:solidFill>
-                  <a:schemeClr val="bg1"/>
-                </a:solidFill>
-                <a:latin typeface="Consolas" pitchFamily="49" charset="0"/>
-                <a:cs typeface="Consolas" pitchFamily="49" charset="0"/>
-              </a:rPr>
-              <a:t>{ </a:t>
-            </a:r>
-          </a:p>
-          <a:p>
-            <a:r>
-              <a:rPr lang="en-US" dirty="0" smtClean="0">
-                <a:solidFill>
-                  <a:schemeClr val="bg1"/>
-                </a:solidFill>
-                <a:latin typeface="Consolas" pitchFamily="49" charset="0"/>
-                <a:cs typeface="Consolas" pitchFamily="49" charset="0"/>
-              </a:rPr>
-              <a:t>	</a:t>
-            </a:r>
-            <a:r>
-              <a:rPr lang="en-US" b="1" dirty="0" smtClean="0">
-                <a:solidFill>
-                  <a:schemeClr val="bg1"/>
-                </a:solidFill>
-                <a:latin typeface="Consolas" pitchFamily="49" charset="0"/>
-                <a:cs typeface="Consolas" pitchFamily="49" charset="0"/>
-              </a:rPr>
-              <a:t>switch</a:t>
-            </a:r>
-            <a:r>
-              <a:rPr lang="en-US" dirty="0" smtClean="0">
-                <a:solidFill>
-                  <a:schemeClr val="bg1"/>
-                </a:solidFill>
-                <a:latin typeface="Consolas" pitchFamily="49" charset="0"/>
-                <a:cs typeface="Consolas" pitchFamily="49" charset="0"/>
-              </a:rPr>
-              <a:t>(b) </a:t>
-            </a:r>
-          </a:p>
-          <a:p>
-            <a:r>
-              <a:rPr lang="en-US" dirty="0" smtClean="0">
-                <a:solidFill>
-                  <a:schemeClr val="bg1"/>
-                </a:solidFill>
-                <a:latin typeface="Consolas" pitchFamily="49" charset="0"/>
-                <a:cs typeface="Consolas" pitchFamily="49" charset="0"/>
-              </a:rPr>
-              <a:t>	{ </a:t>
-            </a:r>
-          </a:p>
-          <a:p>
-            <a:r>
-              <a:rPr lang="en-US" dirty="0" smtClean="0">
-                <a:solidFill>
-                  <a:schemeClr val="bg1"/>
-                </a:solidFill>
-                <a:latin typeface="Consolas" pitchFamily="49" charset="0"/>
-                <a:cs typeface="Consolas" pitchFamily="49" charset="0"/>
-              </a:rPr>
-              <a:t>		</a:t>
-            </a:r>
-            <a:r>
-              <a:rPr lang="en-US" b="1" dirty="0" smtClean="0">
-                <a:solidFill>
-                  <a:schemeClr val="bg1"/>
-                </a:solidFill>
-                <a:latin typeface="Consolas" pitchFamily="49" charset="0"/>
-                <a:cs typeface="Consolas" pitchFamily="49" charset="0"/>
-              </a:rPr>
-              <a:t>case</a:t>
-            </a:r>
-            <a:r>
-              <a:rPr lang="en-US" dirty="0" smtClean="0">
-                <a:solidFill>
-                  <a:schemeClr val="bg1"/>
-                </a:solidFill>
-                <a:latin typeface="Consolas" pitchFamily="49" charset="0"/>
-                <a:cs typeface="Consolas" pitchFamily="49" charset="0"/>
-              </a:rPr>
-              <a:t> true: </a:t>
-            </a:r>
-            <a:r>
-              <a:rPr lang="en-US" b="1" dirty="0" smtClean="0">
-                <a:solidFill>
-                  <a:schemeClr val="bg1"/>
-                </a:solidFill>
-                <a:latin typeface="Consolas" pitchFamily="49" charset="0"/>
-                <a:cs typeface="Consolas" pitchFamily="49" charset="0"/>
-              </a:rPr>
-              <a:t>return</a:t>
-            </a:r>
-            <a:r>
-              <a:rPr lang="en-US" dirty="0" smtClean="0">
-                <a:solidFill>
-                  <a:schemeClr val="bg1"/>
-                </a:solidFill>
-                <a:latin typeface="Consolas" pitchFamily="49" charset="0"/>
-                <a:cs typeface="Consolas" pitchFamily="49" charset="0"/>
-              </a:rPr>
-              <a:t> </a:t>
-            </a:r>
-            <a:r>
-              <a:rPr lang="en-US" dirty="0" err="1" smtClean="0">
-                <a:solidFill>
-                  <a:schemeClr val="bg1"/>
-                </a:solidFill>
-                <a:latin typeface="Consolas" pitchFamily="49" charset="0"/>
-                <a:cs typeface="Consolas" pitchFamily="49" charset="0"/>
-              </a:rPr>
-              <a:t>System.Boolean.TrueString</a:t>
-            </a:r>
-            <a:r>
-              <a:rPr lang="en-US" dirty="0" smtClean="0">
-                <a:solidFill>
-                  <a:schemeClr val="bg1"/>
-                </a:solidFill>
-                <a:latin typeface="Consolas" pitchFamily="49" charset="0"/>
-                <a:cs typeface="Consolas" pitchFamily="49" charset="0"/>
-              </a:rPr>
-              <a:t>;</a:t>
-            </a:r>
-          </a:p>
-          <a:p>
-            <a:r>
-              <a:rPr lang="en-US" dirty="0" smtClean="0">
-                <a:solidFill>
-                  <a:schemeClr val="bg1"/>
-                </a:solidFill>
-                <a:latin typeface="Consolas" pitchFamily="49" charset="0"/>
-                <a:cs typeface="Consolas" pitchFamily="49" charset="0"/>
-              </a:rPr>
-              <a:t>		</a:t>
-            </a:r>
-            <a:r>
-              <a:rPr lang="en-US" b="1" dirty="0" smtClean="0">
-                <a:solidFill>
-                  <a:schemeClr val="bg1"/>
-                </a:solidFill>
-                <a:latin typeface="Consolas" pitchFamily="49" charset="0"/>
-                <a:cs typeface="Consolas" pitchFamily="49" charset="0"/>
-              </a:rPr>
-              <a:t>case</a:t>
-            </a:r>
-            <a:r>
-              <a:rPr lang="en-US" dirty="0" smtClean="0">
-                <a:solidFill>
-                  <a:schemeClr val="bg1"/>
-                </a:solidFill>
-                <a:latin typeface="Consolas" pitchFamily="49" charset="0"/>
-                <a:cs typeface="Consolas" pitchFamily="49" charset="0"/>
-              </a:rPr>
-              <a:t> false: </a:t>
-            </a:r>
-            <a:r>
-              <a:rPr lang="en-US" b="1" dirty="0" smtClean="0">
-                <a:solidFill>
-                  <a:schemeClr val="bg1"/>
-                </a:solidFill>
-                <a:latin typeface="Consolas" pitchFamily="49" charset="0"/>
-                <a:cs typeface="Consolas" pitchFamily="49" charset="0"/>
-              </a:rPr>
-              <a:t>return</a:t>
-            </a:r>
-            <a:r>
-              <a:rPr lang="en-US" dirty="0" smtClean="0">
-                <a:solidFill>
-                  <a:schemeClr val="bg1"/>
-                </a:solidFill>
-                <a:latin typeface="Consolas" pitchFamily="49" charset="0"/>
-                <a:cs typeface="Consolas" pitchFamily="49" charset="0"/>
-              </a:rPr>
-              <a:t> </a:t>
-            </a:r>
-            <a:r>
-              <a:rPr lang="en-US" dirty="0" err="1" smtClean="0">
-                <a:solidFill>
-                  <a:schemeClr val="bg1"/>
-                </a:solidFill>
-                <a:latin typeface="Consolas" pitchFamily="49" charset="0"/>
-                <a:cs typeface="Consolas" pitchFamily="49" charset="0"/>
-              </a:rPr>
-              <a:t>System.Boolean.FalseString</a:t>
-            </a:r>
-            <a:r>
-              <a:rPr lang="en-US" dirty="0" smtClean="0">
-                <a:solidFill>
-                  <a:schemeClr val="bg1"/>
-                </a:solidFill>
-                <a:latin typeface="Consolas" pitchFamily="49" charset="0"/>
-                <a:cs typeface="Consolas" pitchFamily="49" charset="0"/>
-              </a:rPr>
-              <a:t>;</a:t>
-            </a:r>
-          </a:p>
-          <a:p>
-            <a:r>
-              <a:rPr lang="en-US" dirty="0" smtClean="0">
-                <a:solidFill>
-                  <a:schemeClr val="bg1"/>
-                </a:solidFill>
-                <a:latin typeface="Consolas" pitchFamily="49" charset="0"/>
-                <a:cs typeface="Consolas" pitchFamily="49" charset="0"/>
-              </a:rPr>
-              <a:t>		</a:t>
-            </a:r>
-            <a:r>
-              <a:rPr lang="en-US" b="1" dirty="0" smtClean="0">
-                <a:solidFill>
-                  <a:schemeClr val="bg1"/>
-                </a:solidFill>
-                <a:latin typeface="Consolas" pitchFamily="49" charset="0"/>
-                <a:cs typeface="Consolas" pitchFamily="49" charset="0"/>
-              </a:rPr>
-              <a:t>default</a:t>
-            </a:r>
-            <a:r>
-              <a:rPr lang="en-US" dirty="0" smtClean="0">
-                <a:solidFill>
-                  <a:schemeClr val="bg1"/>
-                </a:solidFill>
-                <a:latin typeface="Consolas" pitchFamily="49" charset="0"/>
-                <a:cs typeface="Consolas" pitchFamily="49" charset="0"/>
-              </a:rPr>
-              <a:t>: </a:t>
-            </a:r>
-            <a:r>
-              <a:rPr lang="en-US" b="1" dirty="0" smtClean="0">
-                <a:solidFill>
-                  <a:schemeClr val="bg1"/>
-                </a:solidFill>
-                <a:latin typeface="Consolas" pitchFamily="49" charset="0"/>
-                <a:cs typeface="Consolas" pitchFamily="49" charset="0"/>
-              </a:rPr>
-              <a:t>return</a:t>
-            </a:r>
-            <a:r>
-              <a:rPr lang="en-US" dirty="0" smtClean="0">
-                <a:solidFill>
-                  <a:schemeClr val="bg1"/>
-                </a:solidFill>
-                <a:latin typeface="Consolas" pitchFamily="49" charset="0"/>
-                <a:cs typeface="Consolas" pitchFamily="49" charset="0"/>
-              </a:rPr>
-              <a:t> "error"; </a:t>
-            </a:r>
-          </a:p>
-          <a:p>
-            <a:r>
-              <a:rPr lang="en-US" dirty="0" smtClean="0">
-                <a:solidFill>
-                  <a:schemeClr val="bg1"/>
-                </a:solidFill>
-                <a:latin typeface="Consolas" pitchFamily="49" charset="0"/>
-                <a:cs typeface="Consolas" pitchFamily="49" charset="0"/>
-              </a:rPr>
-              <a:t>	} </a:t>
-            </a:r>
-          </a:p>
-          <a:p>
-            <a:r>
-              <a:rPr lang="en-US" dirty="0" smtClean="0">
-                <a:solidFill>
-                  <a:schemeClr val="bg1"/>
-                </a:solidFill>
-                <a:latin typeface="Consolas" pitchFamily="49" charset="0"/>
-                <a:cs typeface="Consolas" pitchFamily="49" charset="0"/>
-              </a:rPr>
-              <a:t>}</a:t>
-            </a:r>
-            <a:endParaRPr lang="en-US" dirty="0">
-              <a:solidFill>
-                <a:schemeClr val="bg1"/>
-              </a:solidFill>
-              <a:latin typeface="Consolas" pitchFamily="49" charset="0"/>
-              <a:cs typeface="Consolas" pitchFamily="49" charset="0"/>
-            </a:endParaRPr>
-          </a:p>
-        </p:txBody>
-      </p:sp>
-      <p:sp>
-        <p:nvSpPr>
-          <p:cNvPr id="3" name="Rectangle 2"/>
-          <p:cNvSpPr/>
-          <p:nvPr/>
-        </p:nvSpPr>
-        <p:spPr>
-          <a:xfrm>
-            <a:off x="0" y="6611779"/>
-            <a:ext cx="4572000" cy="246221"/>
-          </a:xfrm>
-          <a:prstGeom prst="rect">
-            <a:avLst/>
-          </a:prstGeom>
-        </p:spPr>
-        <p:txBody>
-          <a:bodyPr>
-            <a:spAutoFit/>
-          </a:bodyPr>
-          <a:lstStyle/>
-          <a:p>
-            <a:r>
-              <a:rPr lang="en-US" sz="1000" dirty="0" smtClean="0">
-                <a:solidFill>
-                  <a:schemeClr val="bg1"/>
-                </a:solidFill>
-              </a:rPr>
-              <a:t>http://thedailywtf.com/Articles/Truthful-Strings.aspx</a:t>
-            </a:r>
-            <a:endParaRPr lang="en-US" sz="1000" dirty="0">
-              <a:solidFill>
-                <a:schemeClr val="bg1"/>
-              </a:solidFill>
-            </a:endParaRPr>
-          </a:p>
-        </p:txBody>
-      </p:sp>
+      </p:pic>
     </p:spTree>
   </p:cSld>
   <p:clrMapOvr>
@@ -4562,16 +5140,102 @@
   <p:timing>
     <p:tnLst>
       <p:par>
-        <p:cTn id="1" dur="indefinite" restart="never" nodeType="tmRoot"/>
+        <p:cTn id="1" dur="indefinite" restart="never" nodeType="tmRoot">
+          <p:childTnLst>
+            <p:seq concurrent="1" nextAc="seek">
+              <p:cTn id="2" dur="indefinite" nodeType="mainSeq">
+                <p:childTnLst>
+                  <p:par>
+                    <p:cTn id="3" fill="hold">
+                      <p:stCondLst>
+                        <p:cond delay="indefinite"/>
+                        <p:cond evt="onBegin" delay="0">
+                          <p:tn val="2"/>
+                        </p:cond>
+                      </p:stCondLst>
+                      <p:childTnLst>
+                        <p:par>
+                          <p:cTn id="4" fill="hold">
+                            <p:stCondLst>
+                              <p:cond delay="0"/>
+                            </p:stCondLst>
+                            <p:childTnLst>
+                              <p:par>
+                                <p:cTn id="5" presetID="35" presetClass="emph" presetSubtype="0" repeatCount="indefinite" fill="hold" nodeType="withEffect">
+                                  <p:stCondLst>
+                                    <p:cond delay="0"/>
+                                  </p:stCondLst>
+                                  <p:childTnLst>
+                                    <p:anim calcmode="discrete" valueType="str">
+                                      <p:cBhvr>
+                                        <p:cTn id="6" dur="1000" fill="hold"/>
+                                        <p:tgtEl>
+                                          <p:spTgt spid="1032"/>
+                                        </p:tgtEl>
+                                        <p:attrNameLst>
+                                          <p:attrName>style.visibility</p:attrName>
+                                        </p:attrNameLst>
+                                      </p:cBhvr>
+                                      <p:tavLst>
+                                        <p:tav tm="0">
+                                          <p:val>
+                                            <p:strVal val="hidden"/>
+                                          </p:val>
+                                        </p:tav>
+                                        <p:tav tm="50000">
+                                          <p:val>
+                                            <p:strVal val="visible"/>
+                                          </p:val>
+                                        </p:tav>
+                                      </p:tavLst>
+                                    </p:anim>
+                                  </p:childTnLst>
+                                </p:cTn>
+                              </p:par>
+                            </p:childTnLst>
+                          </p:cTn>
+                        </p:par>
+                      </p:childTnLst>
+                    </p:cTn>
+                  </p:par>
+                </p:childTnLst>
+              </p:cTn>
+              <p:prevCondLst>
+                <p:cond evt="onPrev" delay="0">
+                  <p:tgtEl>
+                    <p:sldTgt/>
+                  </p:tgtEl>
+                </p:cond>
+              </p:prevCondLst>
+              <p:nextCondLst>
+                <p:cond evt="onNext" delay="0">
+                  <p:tgtEl>
+                    <p:sldTgt/>
+                  </p:tgtEl>
+                </p:cond>
+              </p:nextCondLst>
+            </p:seq>
+          </p:childTnLst>
+        </p:cTn>
       </p:par>
     </p:tnLst>
   </p:timing>
 </p:sld>
 </file>
 
-<file path=ppt/slides/slide8.xml><?xml version="1.0" encoding="utf-8"?>
+<file path=ppt/slides/slide6.xml><?xml version="1.0" encoding="utf-8"?>
 <p:sld xmlns:a="http://schemas.openxmlformats.org/drawingml/2006/main" xmlns:r="http://schemas.openxmlformats.org/officeDocument/2006/relationships" xmlns:p="http://schemas.openxmlformats.org/presentationml/2006/main">
   <p:cSld>
+    <p:bg>
+      <p:bgPr>
+        <a:solidFill>
+          <a:schemeClr val="tx2">
+            <a:lumMod val="50000"/>
+          </a:schemeClr>
+        </a:solidFill>
+        <a:effectLst/>
+      </p:bgPr>
+    </p:bg>
     <p:spTree>
       <p:nvGrpSpPr>
         <p:cNvPr id="1" name=""/>
@@ -4586,61 +5250,66 @@
           <a:chExt cx="0" cy="0"/>
         </a:xfrm>
       </p:grpSpPr>
-      <p:sp>
-        <p:nvSpPr>
-          <p:cNvPr id="4" name="Up Arrow 3"/>
-          <p:cNvSpPr/>
+      <p:pic>
+        <p:nvPicPr>
+          <p:cNvPr id="3074" name="Picture 2"/>
+          <p:cNvPicPr>
+            <a:picLocks noChangeAspect="1" noChangeArrowheads="1"/>
+          </p:cNvPicPr>
           <p:nvPr/>
-        </p:nvSpPr>
-        <p:spPr>
-          <a:xfrm rot="5400000">
-            <a:off x="3740729" y="-203073"/>
-            <a:ext cx="2057400" cy="7008098"/>
+        </p:nvPicPr>
+        <p:blipFill>
+          <a:blip r:embed="rId2" cstate="print"/>
+          <a:srcRect/>
+          <a:stretch>
+            <a:fillRect/>
+          </a:stretch>
+        </p:blipFill>
+        <p:spPr bwMode="auto">
+          <a:xfrm>
+            <a:off x="2128838" y="1528763"/>
+            <a:ext cx="4886325" cy="3800475"/>
           </a:xfrm>
-          <a:prstGeom prst="upArrow">
+          <a:prstGeom prst="rect">
             <a:avLst/>
           </a:prstGeom>
-          <a:gradFill flip="none" rotWithShape="1">
-            <a:gsLst>
-              <a:gs pos="0">
-                <a:srgbClr val="00B050"/>
-              </a:gs>
-              <a:gs pos="100000">
-                <a:srgbClr val="FF0000"/>
-              </a:gs>
-              <a:gs pos="50000">
-                <a:srgbClr val="FFFF00"/>
-              </a:gs>
-            </a:gsLst>
-            <a:lin ang="5400000" scaled="1"/>
-            <a:tileRect/>
-          </a:gradFill>
+          <a:noFill/>
+          <a:ln w="9525">
+            <a:noFill/>
+            <a:miter lim="800000"/>
+            <a:headEnd/>
+            <a:tailEnd/>
+          </a:ln>
         </p:spPr>
-        <p:style>
-          <a:lnRef idx="2">
-            <a:schemeClr val="accent1">
-              <a:shade val="50000"/>
-            </a:schemeClr>
-          </a:lnRef>
-          <a:fillRef idx="1">
-            <a:schemeClr val="accent1"/>
-          </a:fillRef>
-          <a:effectRef idx="0">
-            <a:schemeClr val="accent1"/>
-          </a:effectRef>
-          <a:fontRef idx="minor">
-            <a:schemeClr val="lt1"/>
-          </a:fontRef>
-        </p:style>
-        <p:txBody>
-          <a:bodyPr rtlCol="0" anchor="ctr"/>
-          <a:lstStyle/>
-          <a:p>
-            <a:pPr algn="ctr"/>
-            <a:endParaRPr lang="en-US"/>
-          </a:p>
-        </p:txBody>
-      </p:sp>
+      </p:pic>
+      <p:pic>
+        <p:nvPicPr>
+          <p:cNvPr id="6" name="Picture 8" descr="Mute.png (128×128)"/>
+          <p:cNvPicPr>
+            <a:picLocks noChangeAspect="1" noChangeArrowheads="1"/>
+          </p:cNvPicPr>
+          <p:nvPr/>
+        </p:nvPicPr>
+        <p:blipFill>
+          <a:blip r:embed="rId3" cstate="print">
+            <a:lum bright="70000" contrast="-70000"/>
+          </a:blip>
+          <a:srcRect/>
+          <a:stretch>
+            <a:fillRect/>
+          </a:stretch>
+        </p:blipFill>
+        <p:spPr bwMode="auto">
+          <a:xfrm>
+            <a:off x="7772400" y="5638799"/>
+            <a:ext cx="1219200" cy="1219201"/>
+          </a:xfrm>
+          <a:prstGeom prst="rect">
+            <a:avLst/>
+          </a:prstGeom>
+          <a:noFill/>
+        </p:spPr>
+      </p:pic>
     </p:spTree>
   </p:cSld>
   <p:clrMapOvr>
@@ -4649,7 +5318,617 @@
   <p:timing>
     <p:tnLst>
       <p:par>
-        <p:cTn id="1" dur="indefinite" restart="never" nodeType="tmRoot"/>
+        <p:cTn id="1" dur="indefinite" restart="never" nodeType="tmRoot">
+          <p:childTnLst>
+            <p:seq concurrent="1" nextAc="seek">
+              <p:cTn id="2" dur="indefinite" nodeType="mainSeq">
+                <p:childTnLst>
+                  <p:par>
+                    <p:cTn id="3" fill="hold">
+                      <p:stCondLst>
+                        <p:cond delay="indefinite"/>
+                        <p:cond evt="onBegin" delay="0">
+                          <p:tn val="2"/>
+                        </p:cond>
+                      </p:stCondLst>
+                      <p:childTnLst>
+                        <p:par>
+                          <p:cTn id="4" fill="hold">
+                            <p:stCondLst>
+                              <p:cond delay="0"/>
+                            </p:stCondLst>
+                            <p:childTnLst>
+                              <p:par>
+                                <p:cTn id="5" presetID="35" presetClass="emph" presetSubtype="0" repeatCount="indefinite" fill="hold" nodeType="withEffect">
+                                  <p:stCondLst>
+                                    <p:cond delay="0"/>
+                                  </p:stCondLst>
+                                  <p:childTnLst>
+                                    <p:anim calcmode="discrete" valueType="str">
+                                      <p:cBhvr>
+                                        <p:cTn id="6" dur="1000" fill="hold"/>
+                                        <p:tgtEl>
+                                          <p:spTgt spid="6"/>
+                                        </p:tgtEl>
+                                        <p:attrNameLst>
+                                          <p:attrName>style.visibility</p:attrName>
+                                        </p:attrNameLst>
+                                      </p:cBhvr>
+                                      <p:tavLst>
+                                        <p:tav tm="0">
+                                          <p:val>
+                                            <p:strVal val="hidden"/>
+                                          </p:val>
+                                        </p:tav>
+                                        <p:tav tm="50000">
+                                          <p:val>
+                                            <p:strVal val="visible"/>
+                                          </p:val>
+                                        </p:tav>
+                                      </p:tavLst>
+                                    </p:anim>
+                                  </p:childTnLst>
+                                </p:cTn>
+                              </p:par>
+                            </p:childTnLst>
+                          </p:cTn>
+                        </p:par>
+                      </p:childTnLst>
+                    </p:cTn>
+                  </p:par>
+                </p:childTnLst>
+              </p:cTn>
+              <p:prevCondLst>
+                <p:cond evt="onPrev" delay="0">
+                  <p:tgtEl>
+                    <p:sldTgt/>
+                  </p:tgtEl>
+                </p:cond>
+              </p:prevCondLst>
+              <p:nextCondLst>
+                <p:cond evt="onNext" delay="0">
+                  <p:tgtEl>
+                    <p:sldTgt/>
+                  </p:tgtEl>
+                </p:cond>
+              </p:nextCondLst>
+            </p:seq>
+          </p:childTnLst>
+        </p:cTn>
+      </p:par>
+    </p:tnLst>
+  </p:timing>
+</p:sld>
+</file>
+
+<file path=ppt/slides/slide7.xml><?xml version="1.0" encoding="utf-8"?>
+<p:sld xmlns:a="http://schemas.openxmlformats.org/drawingml/2006/main" xmlns:r="http://schemas.openxmlformats.org/officeDocument/2006/relationships" xmlns:p="http://schemas.openxmlformats.org/presentationml/2006/main">
+  <p:cSld>
+    <p:bg>
+      <p:bgPr>
+        <a:solidFill>
+          <a:schemeClr val="tx2">
+            <a:lumMod val="50000"/>
+          </a:schemeClr>
+        </a:solidFill>
+        <a:effectLst/>
+      </p:bgPr>
+    </p:bg>
+    <p:spTree>
+      <p:nvGrpSpPr>
+        <p:cNvPr id="1" name=""/>
+        <p:cNvGrpSpPr/>
+        <p:nvPr/>
+      </p:nvGrpSpPr>
+      <p:grpSpPr>
+        <a:xfrm>
+          <a:off x="0" y="0"/>
+          <a:ext cx="0" cy="0"/>
+          <a:chOff x="0" y="0"/>
+          <a:chExt cx="0" cy="0"/>
+        </a:xfrm>
+      </p:grpSpPr>
+      <p:pic>
+        <p:nvPicPr>
+          <p:cNvPr id="4098" name="Picture 2"/>
+          <p:cNvPicPr>
+            <a:picLocks noChangeAspect="1" noChangeArrowheads="1"/>
+          </p:cNvPicPr>
+          <p:nvPr/>
+        </p:nvPicPr>
+        <p:blipFill>
+          <a:blip r:embed="rId2" cstate="print"/>
+          <a:srcRect/>
+          <a:stretch>
+            <a:fillRect/>
+          </a:stretch>
+        </p:blipFill>
+        <p:spPr bwMode="auto">
+          <a:xfrm>
+            <a:off x="2128838" y="1528763"/>
+            <a:ext cx="4886325" cy="3800475"/>
+          </a:xfrm>
+          <a:prstGeom prst="rect">
+            <a:avLst/>
+          </a:prstGeom>
+          <a:noFill/>
+          <a:ln w="9525">
+            <a:noFill/>
+            <a:miter lim="800000"/>
+            <a:headEnd/>
+            <a:tailEnd/>
+          </a:ln>
+        </p:spPr>
+      </p:pic>
+      <p:pic>
+        <p:nvPicPr>
+          <p:cNvPr id="6" name="Picture 8" descr="Mute.png (128×128)"/>
+          <p:cNvPicPr>
+            <a:picLocks noChangeAspect="1" noChangeArrowheads="1"/>
+          </p:cNvPicPr>
+          <p:nvPr/>
+        </p:nvPicPr>
+        <p:blipFill>
+          <a:blip r:embed="rId3" cstate="print">
+            <a:lum bright="70000" contrast="-70000"/>
+          </a:blip>
+          <a:srcRect/>
+          <a:stretch>
+            <a:fillRect/>
+          </a:stretch>
+        </p:blipFill>
+        <p:spPr bwMode="auto">
+          <a:xfrm>
+            <a:off x="7772400" y="5638799"/>
+            <a:ext cx="1219200" cy="1219201"/>
+          </a:xfrm>
+          <a:prstGeom prst="rect">
+            <a:avLst/>
+          </a:prstGeom>
+          <a:noFill/>
+        </p:spPr>
+      </p:pic>
+    </p:spTree>
+  </p:cSld>
+  <p:clrMapOvr>
+    <a:masterClrMapping/>
+  </p:clrMapOvr>
+  <p:timing>
+    <p:tnLst>
+      <p:par>
+        <p:cTn id="1" dur="indefinite" restart="never" nodeType="tmRoot">
+          <p:childTnLst>
+            <p:seq concurrent="1" nextAc="seek">
+              <p:cTn id="2" dur="indefinite" nodeType="mainSeq">
+                <p:childTnLst>
+                  <p:par>
+                    <p:cTn id="3" fill="hold">
+                      <p:stCondLst>
+                        <p:cond delay="indefinite"/>
+                        <p:cond evt="onBegin" delay="0">
+                          <p:tn val="2"/>
+                        </p:cond>
+                      </p:stCondLst>
+                      <p:childTnLst>
+                        <p:par>
+                          <p:cTn id="4" fill="hold">
+                            <p:stCondLst>
+                              <p:cond delay="0"/>
+                            </p:stCondLst>
+                            <p:childTnLst>
+                              <p:par>
+                                <p:cTn id="5" presetID="35" presetClass="emph" presetSubtype="0" repeatCount="indefinite" fill="hold" nodeType="withEffect">
+                                  <p:stCondLst>
+                                    <p:cond delay="0"/>
+                                  </p:stCondLst>
+                                  <p:childTnLst>
+                                    <p:anim calcmode="discrete" valueType="str">
+                                      <p:cBhvr>
+                                        <p:cTn id="6" dur="1000" fill="hold"/>
+                                        <p:tgtEl>
+                                          <p:spTgt spid="6"/>
+                                        </p:tgtEl>
+                                        <p:attrNameLst>
+                                          <p:attrName>style.visibility</p:attrName>
+                                        </p:attrNameLst>
+                                      </p:cBhvr>
+                                      <p:tavLst>
+                                        <p:tav tm="0">
+                                          <p:val>
+                                            <p:strVal val="hidden"/>
+                                          </p:val>
+                                        </p:tav>
+                                        <p:tav tm="50000">
+                                          <p:val>
+                                            <p:strVal val="visible"/>
+                                          </p:val>
+                                        </p:tav>
+                                      </p:tavLst>
+                                    </p:anim>
+                                  </p:childTnLst>
+                                </p:cTn>
+                              </p:par>
+                            </p:childTnLst>
+                          </p:cTn>
+                        </p:par>
+                      </p:childTnLst>
+                    </p:cTn>
+                  </p:par>
+                </p:childTnLst>
+              </p:cTn>
+              <p:prevCondLst>
+                <p:cond evt="onPrev" delay="0">
+                  <p:tgtEl>
+                    <p:sldTgt/>
+                  </p:tgtEl>
+                </p:cond>
+              </p:prevCondLst>
+              <p:nextCondLst>
+                <p:cond evt="onNext" delay="0">
+                  <p:tgtEl>
+                    <p:sldTgt/>
+                  </p:tgtEl>
+                </p:cond>
+              </p:nextCondLst>
+            </p:seq>
+          </p:childTnLst>
+        </p:cTn>
+      </p:par>
+    </p:tnLst>
+  </p:timing>
+</p:sld>
+</file>
+
+<file path=ppt/slides/slide8.xml><?xml version="1.0" encoding="utf-8"?>
+<p:sld xmlns:a="http://schemas.openxmlformats.org/drawingml/2006/main" xmlns:r="http://schemas.openxmlformats.org/officeDocument/2006/relationships" xmlns:p="http://schemas.openxmlformats.org/presentationml/2006/main">
+  <p:cSld>
+    <p:bg>
+      <p:bgPr>
+        <a:solidFill>
+          <a:schemeClr val="tx2">
+            <a:lumMod val="50000"/>
+          </a:schemeClr>
+        </a:solidFill>
+        <a:effectLst/>
+      </p:bgPr>
+    </p:bg>
+    <p:spTree>
+      <p:nvGrpSpPr>
+        <p:cNvPr id="1" name=""/>
+        <p:cNvGrpSpPr/>
+        <p:nvPr/>
+      </p:nvGrpSpPr>
+      <p:grpSpPr>
+        <a:xfrm>
+          <a:off x="0" y="0"/>
+          <a:ext cx="0" cy="0"/>
+          <a:chOff x="0" y="0"/>
+          <a:chExt cx="0" cy="0"/>
+        </a:xfrm>
+      </p:grpSpPr>
+      <p:pic>
+        <p:nvPicPr>
+          <p:cNvPr id="5122" name="Picture 2"/>
+          <p:cNvPicPr>
+            <a:picLocks noChangeAspect="1" noChangeArrowheads="1"/>
+          </p:cNvPicPr>
+          <p:nvPr/>
+        </p:nvPicPr>
+        <p:blipFill>
+          <a:blip r:embed="rId2" cstate="print"/>
+          <a:srcRect/>
+          <a:stretch>
+            <a:fillRect/>
+          </a:stretch>
+        </p:blipFill>
+        <p:spPr bwMode="auto">
+          <a:xfrm>
+            <a:off x="2128838" y="1528763"/>
+            <a:ext cx="4886325" cy="3800475"/>
+          </a:xfrm>
+          <a:prstGeom prst="rect">
+            <a:avLst/>
+          </a:prstGeom>
+          <a:noFill/>
+          <a:ln w="9525">
+            <a:noFill/>
+            <a:miter lim="800000"/>
+            <a:headEnd/>
+            <a:tailEnd/>
+          </a:ln>
+        </p:spPr>
+      </p:pic>
+      <p:pic>
+        <p:nvPicPr>
+          <p:cNvPr id="6" name="Picture 8" descr="Mute.png (128×128)"/>
+          <p:cNvPicPr>
+            <a:picLocks noChangeAspect="1" noChangeArrowheads="1"/>
+          </p:cNvPicPr>
+          <p:nvPr/>
+        </p:nvPicPr>
+        <p:blipFill>
+          <a:blip r:embed="rId3" cstate="print">
+            <a:lum bright="70000" contrast="-70000"/>
+          </a:blip>
+          <a:srcRect/>
+          <a:stretch>
+            <a:fillRect/>
+          </a:stretch>
+        </p:blipFill>
+        <p:spPr bwMode="auto">
+          <a:xfrm>
+            <a:off x="7772400" y="5638799"/>
+            <a:ext cx="1219200" cy="1219201"/>
+          </a:xfrm>
+          <a:prstGeom prst="rect">
+            <a:avLst/>
+          </a:prstGeom>
+          <a:noFill/>
+        </p:spPr>
+      </p:pic>
+    </p:spTree>
+  </p:cSld>
+  <p:clrMapOvr>
+    <a:masterClrMapping/>
+  </p:clrMapOvr>
+  <p:timing>
+    <p:tnLst>
+      <p:par>
+        <p:cTn id="1" dur="indefinite" restart="never" nodeType="tmRoot">
+          <p:childTnLst>
+            <p:seq concurrent="1" nextAc="seek">
+              <p:cTn id="2" dur="indefinite" nodeType="mainSeq">
+                <p:childTnLst>
+                  <p:par>
+                    <p:cTn id="3" fill="hold">
+                      <p:stCondLst>
+                        <p:cond delay="indefinite"/>
+                        <p:cond evt="onBegin" delay="0">
+                          <p:tn val="2"/>
+                        </p:cond>
+                      </p:stCondLst>
+                      <p:childTnLst>
+                        <p:par>
+                          <p:cTn id="4" fill="hold">
+                            <p:stCondLst>
+                              <p:cond delay="0"/>
+                            </p:stCondLst>
+                            <p:childTnLst>
+                              <p:par>
+                                <p:cTn id="5" presetID="35" presetClass="emph" presetSubtype="0" repeatCount="indefinite" fill="hold" nodeType="withEffect">
+                                  <p:stCondLst>
+                                    <p:cond delay="0"/>
+                                  </p:stCondLst>
+                                  <p:childTnLst>
+                                    <p:anim calcmode="discrete" valueType="str">
+                                      <p:cBhvr>
+                                        <p:cTn id="6" dur="1000" fill="hold"/>
+                                        <p:tgtEl>
+                                          <p:spTgt spid="6"/>
+                                        </p:tgtEl>
+                                        <p:attrNameLst>
+                                          <p:attrName>style.visibility</p:attrName>
+                                        </p:attrNameLst>
+                                      </p:cBhvr>
+                                      <p:tavLst>
+                                        <p:tav tm="0">
+                                          <p:val>
+                                            <p:strVal val="hidden"/>
+                                          </p:val>
+                                        </p:tav>
+                                        <p:tav tm="50000">
+                                          <p:val>
+                                            <p:strVal val="visible"/>
+                                          </p:val>
+                                        </p:tav>
+                                      </p:tavLst>
+                                    </p:anim>
+                                  </p:childTnLst>
+                                </p:cTn>
+                              </p:par>
+                            </p:childTnLst>
+                          </p:cTn>
+                        </p:par>
+                      </p:childTnLst>
+                    </p:cTn>
+                  </p:par>
+                </p:childTnLst>
+              </p:cTn>
+              <p:prevCondLst>
+                <p:cond evt="onPrev" delay="0">
+                  <p:tgtEl>
+                    <p:sldTgt/>
+                  </p:tgtEl>
+                </p:cond>
+              </p:prevCondLst>
+              <p:nextCondLst>
+                <p:cond evt="onNext" delay="0">
+                  <p:tgtEl>
+                    <p:sldTgt/>
+                  </p:tgtEl>
+                </p:cond>
+              </p:nextCondLst>
+            </p:seq>
+          </p:childTnLst>
+        </p:cTn>
+      </p:par>
+    </p:tnLst>
+  </p:timing>
+</p:sld>
+</file>
+
+<file path=ppt/slides/slide9.xml><?xml version="1.0" encoding="utf-8"?>
+<p:sld xmlns:a="http://schemas.openxmlformats.org/drawingml/2006/main" xmlns:r="http://schemas.openxmlformats.org/officeDocument/2006/relationships" xmlns:p="http://schemas.openxmlformats.org/presentationml/2006/main">
+  <p:cSld>
+    <p:bg>
+      <p:bgPr>
+        <a:solidFill>
+          <a:schemeClr val="tx2">
+            <a:lumMod val="50000"/>
+          </a:schemeClr>
+        </a:solidFill>
+        <a:effectLst/>
+      </p:bgPr>
+    </p:bg>
+    <p:spTree>
+      <p:nvGrpSpPr>
+        <p:cNvPr id="1" name=""/>
+        <p:cNvGrpSpPr/>
+        <p:nvPr/>
+      </p:nvGrpSpPr>
+      <p:grpSpPr>
+        <a:xfrm>
+          <a:off x="0" y="0"/>
+          <a:ext cx="0" cy="0"/>
+          <a:chOff x="0" y="0"/>
+          <a:chExt cx="0" cy="0"/>
+        </a:xfrm>
+      </p:grpSpPr>
+      <p:pic>
+        <p:nvPicPr>
+          <p:cNvPr id="6146" name="Picture 2"/>
+          <p:cNvPicPr>
+            <a:picLocks noChangeAspect="1" noChangeArrowheads="1"/>
+          </p:cNvPicPr>
+          <p:nvPr/>
+        </p:nvPicPr>
+        <p:blipFill>
+          <a:blip r:embed="rId2" cstate="print"/>
+          <a:srcRect/>
+          <a:stretch>
+            <a:fillRect/>
+          </a:stretch>
+        </p:blipFill>
+        <p:spPr bwMode="auto">
+          <a:xfrm>
+            <a:off x="2128838" y="1528763"/>
+            <a:ext cx="4886325" cy="3800475"/>
+          </a:xfrm>
+          <a:prstGeom prst="rect">
+            <a:avLst/>
+          </a:prstGeom>
+          <a:noFill/>
+          <a:ln w="9525">
+            <a:noFill/>
+            <a:miter lim="800000"/>
+            <a:headEnd/>
+            <a:tailEnd/>
+          </a:ln>
+        </p:spPr>
+      </p:pic>
+      <p:pic>
+        <p:nvPicPr>
+          <p:cNvPr id="6" name="Picture 8" descr="Mute.png (128×128)"/>
+          <p:cNvPicPr>
+            <a:picLocks noChangeAspect="1" noChangeArrowheads="1"/>
+          </p:cNvPicPr>
+          <p:nvPr/>
+        </p:nvPicPr>
+        <p:blipFill>
+          <a:blip r:embed="rId3" cstate="print">
+            <a:lum bright="70000" contrast="-70000"/>
+          </a:blip>
+          <a:srcRect/>
+          <a:stretch>
+            <a:fillRect/>
+          </a:stretch>
+        </p:blipFill>
+        <p:spPr bwMode="auto">
+          <a:xfrm>
+            <a:off x="7772400" y="5638799"/>
+            <a:ext cx="1219200" cy="1219201"/>
+          </a:xfrm>
+          <a:prstGeom prst="rect">
+            <a:avLst/>
+          </a:prstGeom>
+          <a:noFill/>
+        </p:spPr>
+      </p:pic>
+    </p:spTree>
+  </p:cSld>
+  <p:clrMapOvr>
+    <a:masterClrMapping/>
+  </p:clrMapOvr>
+  <p:timing>
+    <p:tnLst>
+      <p:par>
+        <p:cTn id="1" dur="indefinite" restart="never" nodeType="tmRoot">
+          <p:childTnLst>
+            <p:seq concurrent="1" nextAc="seek">
+              <p:cTn id="2" dur="indefinite" nodeType="mainSeq">
+                <p:childTnLst>
+                  <p:par>
+                    <p:cTn id="3" fill="hold">
+                      <p:stCondLst>
+                        <p:cond delay="indefinite"/>
+                        <p:cond evt="onBegin" delay="0">
+                          <p:tn val="2"/>
+                        </p:cond>
+                      </p:stCondLst>
+                      <p:childTnLst>
+                        <p:par>
+                          <p:cTn id="4" fill="hold">
+                            <p:stCondLst>
+                              <p:cond delay="0"/>
+                            </p:stCondLst>
+                            <p:childTnLst>
+                              <p:par>
+                                <p:cTn id="5" presetID="35" presetClass="emph" presetSubtype="0" repeatCount="indefinite" fill="hold" nodeType="withEffect">
+                                  <p:stCondLst>
+                                    <p:cond delay="0"/>
+                                  </p:stCondLst>
+                                  <p:childTnLst>
+                                    <p:anim calcmode="discrete" valueType="str">
+                                      <p:cBhvr>
+                                        <p:cTn id="6" dur="1000" fill="hold"/>
+                                        <p:tgtEl>
+                                          <p:spTgt spid="6"/>
+                                        </p:tgtEl>
+                                        <p:attrNameLst>
+                                          <p:attrName>style.visibility</p:attrName>
+                                        </p:attrNameLst>
+                                      </p:cBhvr>
+                                      <p:tavLst>
+                                        <p:tav tm="0">
+                                          <p:val>
+                                            <p:strVal val="hidden"/>
+                                          </p:val>
+                                        </p:tav>
+                                        <p:tav tm="50000">
+                                          <p:val>
+                                            <p:strVal val="visible"/>
+                                          </p:val>
+                                        </p:tav>
+                                      </p:tavLst>
+                                    </p:anim>
+                                  </p:childTnLst>
+                                </p:cTn>
+                              </p:par>
+                            </p:childTnLst>
+                          </p:cTn>
+                        </p:par>
+                      </p:childTnLst>
+                    </p:cTn>
+                  </p:par>
+                </p:childTnLst>
+              </p:cTn>
+              <p:prevCondLst>
+                <p:cond evt="onPrev" delay="0">
+                  <p:tgtEl>
+                    <p:sldTgt/>
+                  </p:tgtEl>
+                </p:cond>
+              </p:prevCondLst>
+              <p:nextCondLst>
+                <p:cond evt="onNext" delay="0">
+                  <p:tgtEl>
+                    <p:sldTgt/>
+                  </p:tgtEl>
+                </p:cond>
+              </p:nextCondLst>
+            </p:seq>
+          </p:childTnLst>
+        </p:cTn>
       </p:par>
     </p:tnLst>
   </p:timing>

</xml_diff>